<commit_message>
almost done scalaCL part
</commit_message>
<xml_diff>
--- a/ScalaCL_Chissel.pptx
+++ b/ScalaCL_Chissel.pptx
@@ -5,14 +5,16 @@
     <p:sldMasterId id="2147483648" r:id="rId1"/>
   </p:sldMasterIdLst>
   <p:notesMasterIdLst>
-    <p:notesMasterId r:id="rId7"/>
+    <p:notesMasterId r:id="rId9"/>
   </p:notesMasterIdLst>
   <p:sldIdLst>
     <p:sldId id="351" r:id="rId2"/>
     <p:sldId id="446" r:id="rId3"/>
     <p:sldId id="447" r:id="rId4"/>
     <p:sldId id="448" r:id="rId5"/>
-    <p:sldId id="445" r:id="rId6"/>
+    <p:sldId id="450" r:id="rId6"/>
+    <p:sldId id="449" r:id="rId7"/>
+    <p:sldId id="445" r:id="rId8"/>
   </p:sldIdLst>
   <p:sldSz cx="9144000" cy="6858000" type="screen4x3"/>
   <p:notesSz cx="6858000" cy="9144000"/>
@@ -3561,6 +3563,187 @@
           </a:p>
         </p:txBody>
       </p:sp>
+      <p:sp>
+        <p:nvSpPr>
+          <p:cNvPr id="4" name="TextBox 3"/>
+          <p:cNvSpPr txBox="1"/>
+          <p:nvPr/>
+        </p:nvSpPr>
+        <p:spPr>
+          <a:xfrm>
+            <a:off x="889348" y="1691014"/>
+            <a:ext cx="5320687" cy="1754326"/>
+          </a:xfrm>
+          <a:prstGeom prst="rect">
+            <a:avLst/>
+          </a:prstGeom>
+          <a:noFill/>
+        </p:spPr>
+        <p:txBody>
+          <a:bodyPr wrap="none" rtlCol="0">
+            <a:spAutoFit/>
+          </a:bodyPr>
+          <a:lstStyle/>
+          <a:p>
+            <a:pPr marL="285750" indent="-285750">
+              <a:buFont typeface="Arial" panose="020B0604020202020204" pitchFamily="34" charset="0"/>
+              <a:buChar char="•"/>
+            </a:pPr>
+            <a:r>
+              <a:rPr lang="en-GB" dirty="0" smtClean="0">
+                <a:latin typeface="Comic Sans MS" panose="030F0702030302020204" pitchFamily="66" charset="0"/>
+                <a:cs typeface="Consolas" panose="020B0609020204030204" pitchFamily="49" charset="0"/>
+              </a:rPr>
+              <a:t>Not to be confused with </a:t>
+            </a:r>
+            <a:r>
+              <a:rPr lang="en-GB" dirty="0">
+                <a:latin typeface="Comic Sans MS" panose="030F0702030302020204" pitchFamily="66" charset="0"/>
+                <a:cs typeface="Consolas" panose="020B0609020204030204" pitchFamily="49" charset="0"/>
+              </a:rPr>
+              <a:t>O</a:t>
+            </a:r>
+            <a:r>
+              <a:rPr lang="en-GB" dirty="0" smtClean="0">
+                <a:latin typeface="Comic Sans MS" panose="030F0702030302020204" pitchFamily="66" charset="0"/>
+                <a:cs typeface="Consolas" panose="020B0609020204030204" pitchFamily="49" charset="0"/>
+              </a:rPr>
+              <a:t>penGL</a:t>
+            </a:r>
+          </a:p>
+          <a:p>
+            <a:pPr marL="285750" indent="-285750">
+              <a:buFont typeface="Arial" panose="020B0604020202020204" pitchFamily="34" charset="0"/>
+              <a:buChar char="•"/>
+            </a:pPr>
+            <a:r>
+              <a:rPr lang="en-GB" dirty="0" smtClean="0">
+                <a:latin typeface="Comic Sans MS" panose="030F0702030302020204" pitchFamily="66" charset="0"/>
+                <a:cs typeface="Consolas" panose="020B0609020204030204" pitchFamily="49" charset="0"/>
+              </a:rPr>
+              <a:t>CLC </a:t>
+            </a:r>
+            <a:r>
+              <a:rPr lang="en-GB" dirty="0">
+                <a:latin typeface="Comic Sans MS" panose="030F0702030302020204" pitchFamily="66" charset="0"/>
+                <a:cs typeface="Consolas" panose="020B0609020204030204" pitchFamily="49" charset="0"/>
+              </a:rPr>
+              <a:t>code (i.e</a:t>
+            </a:r>
+            <a:r>
+              <a:rPr lang="en-GB" dirty="0" smtClean="0">
+                <a:latin typeface="Comic Sans MS" panose="030F0702030302020204" pitchFamily="66" charset="0"/>
+                <a:cs typeface="Consolas" panose="020B0609020204030204" pitchFamily="49" charset="0"/>
+              </a:rPr>
+              <a:t>. the </a:t>
+            </a:r>
+            <a:r>
+              <a:rPr lang="en-GB" dirty="0">
+                <a:latin typeface="Comic Sans MS" panose="030F0702030302020204" pitchFamily="66" charset="0"/>
+                <a:cs typeface="Consolas" panose="020B0609020204030204" pitchFamily="49" charset="0"/>
+              </a:rPr>
+              <a:t>kernels</a:t>
+            </a:r>
+            <a:r>
+              <a:rPr lang="en-GB" dirty="0" smtClean="0">
+                <a:latin typeface="Comic Sans MS" panose="030F0702030302020204" pitchFamily="66" charset="0"/>
+                <a:cs typeface="Consolas" panose="020B0609020204030204" pitchFamily="49" charset="0"/>
+              </a:rPr>
+              <a:t>) </a:t>
+            </a:r>
+            <a:r>
+              <a:rPr lang="en-GB" dirty="0">
+                <a:latin typeface="Comic Sans MS" panose="030F0702030302020204" pitchFamily="66" charset="0"/>
+                <a:cs typeface="Consolas" panose="020B0609020204030204" pitchFamily="49" charset="0"/>
+              </a:rPr>
+              <a:t>runs on the device</a:t>
+            </a:r>
+          </a:p>
+          <a:p>
+            <a:pPr marL="285750" indent="-285750">
+              <a:buFont typeface="Arial" panose="020B0604020202020204" pitchFamily="34" charset="0"/>
+              <a:buChar char="•"/>
+            </a:pPr>
+            <a:r>
+              <a:rPr lang="en-GB" dirty="0" smtClean="0">
+                <a:latin typeface="Comic Sans MS" panose="030F0702030302020204" pitchFamily="66" charset="0"/>
+                <a:cs typeface="Consolas" panose="020B0609020204030204" pitchFamily="49" charset="0"/>
+              </a:rPr>
+              <a:t>The kernels are called by using a C/C++ API</a:t>
+            </a:r>
+          </a:p>
+          <a:p>
+            <a:pPr marL="285750" indent="-285750">
+              <a:buFont typeface="Arial" panose="020B0604020202020204" pitchFamily="34" charset="0"/>
+              <a:buChar char="•"/>
+            </a:pPr>
+            <a:r>
+              <a:rPr lang="en-GB" dirty="0" smtClean="0">
+                <a:latin typeface="Comic Sans MS" panose="030F0702030302020204" pitchFamily="66" charset="0"/>
+                <a:cs typeface="Consolas" panose="020B0609020204030204" pitchFamily="49" charset="0"/>
+              </a:rPr>
+              <a:t>Supported devices:</a:t>
+            </a:r>
+          </a:p>
+          <a:p>
+            <a:pPr marL="742950" lvl="1" indent="-285750">
+              <a:buFont typeface="Arial" panose="020B0604020202020204" pitchFamily="34" charset="0"/>
+              <a:buChar char="•"/>
+            </a:pPr>
+            <a:r>
+              <a:rPr lang="en-GB" smtClean="0">
+                <a:latin typeface="Comic Sans MS" panose="030F0702030302020204" pitchFamily="66" charset="0"/>
+                <a:cs typeface="Consolas" panose="020B0609020204030204" pitchFamily="49" charset="0"/>
+              </a:rPr>
+              <a:t>Most graphics cards</a:t>
+            </a:r>
+            <a:endParaRPr lang="en-GB" dirty="0" smtClean="0">
+              <a:latin typeface="Comic Sans MS" panose="030F0702030302020204" pitchFamily="66" charset="0"/>
+              <a:cs typeface="Consolas" panose="020B0609020204030204" pitchFamily="49" charset="0"/>
+            </a:endParaRPr>
+          </a:p>
+          <a:p>
+            <a:pPr marL="742950" lvl="1" indent="-285750">
+              <a:buFont typeface="Arial" panose="020B0604020202020204" pitchFamily="34" charset="0"/>
+              <a:buChar char="•"/>
+            </a:pPr>
+            <a:endParaRPr lang="lv-LV" dirty="0">
+              <a:latin typeface="Comic Sans MS" panose="030F0702030302020204" pitchFamily="66" charset="0"/>
+              <a:cs typeface="Consolas" panose="020B0609020204030204" pitchFamily="49" charset="0"/>
+            </a:endParaRPr>
+          </a:p>
+        </p:txBody>
+      </p:sp>
+      <p:sp>
+        <p:nvSpPr>
+          <p:cNvPr id="5" name="TextBox 4"/>
+          <p:cNvSpPr txBox="1"/>
+          <p:nvPr/>
+        </p:nvSpPr>
+        <p:spPr>
+          <a:xfrm>
+            <a:off x="1402915" y="4058433"/>
+            <a:ext cx="1544077" cy="369332"/>
+          </a:xfrm>
+          <a:prstGeom prst="rect">
+            <a:avLst/>
+          </a:prstGeom>
+          <a:noFill/>
+        </p:spPr>
+        <p:txBody>
+          <a:bodyPr wrap="none" rtlCol="0">
+            <a:spAutoFit/>
+          </a:bodyPr>
+          <a:lstStyle/>
+          <a:p>
+            <a:r>
+              <a:rPr lang="en-GB" dirty="0" smtClean="0"/>
+              <a:t>TODO pictures</a:t>
+            </a:r>
+            <a:endParaRPr lang="lv-LV" dirty="0"/>
+          </a:p>
+        </p:txBody>
+      </p:sp>
     </p:spTree>
     <p:extLst>
       <p:ext uri="{BB962C8B-B14F-4D97-AF65-F5344CB8AC3E}">
@@ -3633,8 +3816,8 @@
           <a:p>
             <a:pPr algn="ctr"/>
             <a:r>
-              <a:rPr lang="lv-LV" dirty="0" err="1" smtClean="0"/>
-              <a:t>Main.scala</a:t>
+              <a:rPr lang="en-GB" dirty="0" err="1" smtClean="0"/>
+              <a:t>Test.scala</a:t>
             </a:r>
             <a:endParaRPr lang="en-US" dirty="0"/>
           </a:p>
@@ -3674,6 +3857,18 @@
                 <a:cs typeface="Comic Sans MS"/>
               </a:rPr>
               <a:t>ScalaCL</a:t>
+            </a:r>
+            <a:r>
+              <a:rPr lang="en-GB" dirty="0">
+                <a:solidFill>
+                  <a:schemeClr val="bg1">
+                    <a:lumMod val="50000"/>
+                  </a:schemeClr>
+                </a:solidFill>
+                <a:latin typeface="Comic Sans MS"/>
+                <a:cs typeface="Comic Sans MS"/>
+              </a:rPr>
+              <a:t> syntax</a:t>
             </a:r>
             <a:endParaRPr lang="en-US" dirty="0"/>
           </a:p>
@@ -4318,7 +4513,7 @@
         <p:spPr>
           <a:xfrm>
             <a:off x="1265129" y="5649238"/>
-            <a:ext cx="4070959" cy="369332"/>
+            <a:ext cx="5349713" cy="461665"/>
           </a:xfrm>
           <a:prstGeom prst="rect">
             <a:avLst/>
@@ -4332,41 +4527,41 @@
           <a:lstStyle/>
           <a:p>
             <a:r>
-              <a:rPr lang="en-GB" dirty="0">
+              <a:rPr lang="en-GB" sz="2400" dirty="0">
                 <a:latin typeface="Comic Sans MS" panose="030F0702030302020204" pitchFamily="66" charset="0"/>
                 <a:cs typeface="Consolas" panose="020B0609020204030204" pitchFamily="49" charset="0"/>
               </a:rPr>
               <a:t>Exercise</a:t>
             </a:r>
             <a:r>
-              <a:rPr lang="lv-LV" dirty="0">
+              <a:rPr lang="lv-LV" sz="2400" dirty="0">
                 <a:latin typeface="Comic Sans MS" panose="030F0702030302020204" pitchFamily="66" charset="0"/>
                 <a:cs typeface="Consolas" panose="020B0609020204030204" pitchFamily="49" charset="0"/>
               </a:rPr>
               <a:t>: s</a:t>
             </a:r>
             <a:r>
-              <a:rPr lang="en-GB" dirty="0">
+              <a:rPr lang="en-GB" sz="2400" dirty="0">
                 <a:latin typeface="Comic Sans MS" panose="030F0702030302020204" pitchFamily="66" charset="0"/>
                 <a:cs typeface="Consolas" panose="020B0609020204030204" pitchFamily="49" charset="0"/>
               </a:rPr>
               <a:t>pot the </a:t>
             </a:r>
             <a:r>
-              <a:rPr lang="en-GB" dirty="0" err="1">
+              <a:rPr lang="en-GB" sz="2400" dirty="0" err="1">
                 <a:latin typeface="Comic Sans MS" panose="030F0702030302020204" pitchFamily="66" charset="0"/>
                 <a:cs typeface="Consolas" panose="020B0609020204030204" pitchFamily="49" charset="0"/>
               </a:rPr>
               <a:t>OpenCL</a:t>
             </a:r>
             <a:r>
-              <a:rPr lang="en-GB" dirty="0">
+              <a:rPr lang="en-GB" sz="2400" dirty="0">
                 <a:latin typeface="Comic Sans MS" panose="030F0702030302020204" pitchFamily="66" charset="0"/>
                 <a:cs typeface="Consolas" panose="020B0609020204030204" pitchFamily="49" charset="0"/>
               </a:rPr>
               <a:t> here! </a:t>
             </a:r>
-            <a:endParaRPr lang="en-GB" dirty="0">
+            <a:endParaRPr lang="en-GB" sz="2400" dirty="0">
               <a:latin typeface="Comic Sans MS" panose="030F0702030302020204" pitchFamily="66" charset="0"/>
               <a:cs typeface="Consolas" panose="020B0609020204030204" pitchFamily="49" charset="0"/>
             </a:endParaRPr>
@@ -4495,6 +4690,18 @@
               </a:rPr>
               <a:t>ScalaCL</a:t>
             </a:r>
+            <a:r>
+              <a:rPr lang="en-GB" dirty="0">
+                <a:solidFill>
+                  <a:schemeClr val="bg1">
+                    <a:lumMod val="50000"/>
+                  </a:schemeClr>
+                </a:solidFill>
+                <a:latin typeface="Comic Sans MS"/>
+                <a:cs typeface="Comic Sans MS"/>
+              </a:rPr>
+              <a:t> syntax</a:t>
+            </a:r>
             <a:endParaRPr lang="en-US" dirty="0"/>
           </a:p>
         </p:txBody>
@@ -5158,7 +5365,7 @@
         <p:spPr>
           <a:xfrm>
             <a:off x="7803716" y="2560638"/>
-            <a:ext cx="751560" cy="646331"/>
+            <a:ext cx="1114816" cy="830997"/>
           </a:xfrm>
           <a:prstGeom prst="rect">
             <a:avLst/>
@@ -5172,7 +5379,7 @@
           <a:lstStyle/>
           <a:p>
             <a:r>
-              <a:rPr lang="en-GB" dirty="0" smtClean="0">
+              <a:rPr lang="en-GB" sz="2400" dirty="0" smtClean="0">
                 <a:solidFill>
                   <a:schemeClr val="accent1"/>
                 </a:solidFill>
@@ -5181,7 +5388,7 @@
               </a:rPr>
               <a:t>Here it is! </a:t>
             </a:r>
-            <a:endParaRPr lang="en-GB" dirty="0">
+            <a:endParaRPr lang="en-GB" sz="2400" dirty="0">
               <a:solidFill>
                 <a:schemeClr val="accent1"/>
               </a:solidFill>
@@ -5201,8 +5408,8 @@
         </p:nvCxnSpPr>
         <p:spPr>
           <a:xfrm rot="16200000" flipV="1">
-            <a:off x="5417162" y="-201697"/>
-            <a:ext cx="576889" cy="4947781"/>
+            <a:off x="5507977" y="-292509"/>
+            <a:ext cx="576888" cy="5129406"/>
           </a:xfrm>
           <a:prstGeom prst="curvedConnector2">
             <a:avLst/>
@@ -5236,8 +5443,8 @@
         </p:nvCxnSpPr>
         <p:spPr>
           <a:xfrm rot="10800000" flipV="1">
-            <a:off x="5874708" y="2883804"/>
-            <a:ext cx="1929009" cy="253724"/>
+            <a:off x="5874718" y="2976137"/>
+            <a:ext cx="1928999" cy="161390"/>
           </a:xfrm>
           <a:prstGeom prst="curvedConnector3">
             <a:avLst>
@@ -5273,8 +5480,8 @@
         </p:nvCxnSpPr>
         <p:spPr>
           <a:xfrm rot="5400000">
-            <a:off x="6718611" y="1999810"/>
-            <a:ext cx="253727" cy="2668044"/>
+            <a:off x="6901760" y="2001331"/>
+            <a:ext cx="69061" cy="2849669"/>
           </a:xfrm>
           <a:prstGeom prst="curvedConnector2">
             <a:avLst/>
@@ -5319,6 +5526,3132 @@
 </file>
 
 <file path=ppt/slides/slide5.xml><?xml version="1.0" encoding="utf-8"?>
+<p:sld xmlns:a="http://schemas.openxmlformats.org/drawingml/2006/main" xmlns:r="http://schemas.openxmlformats.org/officeDocument/2006/relationships" xmlns:p="http://schemas.openxmlformats.org/presentationml/2006/main">
+  <p:cSld>
+    <p:spTree>
+      <p:nvGrpSpPr>
+        <p:cNvPr id="1" name=""/>
+        <p:cNvGrpSpPr/>
+        <p:nvPr/>
+      </p:nvGrpSpPr>
+      <p:grpSpPr>
+        <a:xfrm>
+          <a:off x="0" y="0"/>
+          <a:ext cx="0" cy="0"/>
+          <a:chOff x="0" y="0"/>
+          <a:chExt cx="0" cy="0"/>
+        </a:xfrm>
+      </p:grpSpPr>
+      <p:sp>
+        <p:nvSpPr>
+          <p:cNvPr id="20" name="Rectangle 19"/>
+          <p:cNvSpPr/>
+          <p:nvPr/>
+        </p:nvSpPr>
+        <p:spPr>
+          <a:xfrm>
+            <a:off x="457201" y="1416620"/>
+            <a:ext cx="3045448" cy="360040"/>
+          </a:xfrm>
+          <a:prstGeom prst="rect">
+            <a:avLst/>
+          </a:prstGeom>
+        </p:spPr>
+        <p:style>
+          <a:lnRef idx="2">
+            <a:schemeClr val="accent1"/>
+          </a:lnRef>
+          <a:fillRef idx="1">
+            <a:schemeClr val="lt1"/>
+          </a:fillRef>
+          <a:effectRef idx="0">
+            <a:schemeClr val="accent1"/>
+          </a:effectRef>
+          <a:fontRef idx="minor">
+            <a:schemeClr val="dk1"/>
+          </a:fontRef>
+        </p:style>
+        <p:txBody>
+          <a:bodyPr rtlCol="0" anchor="ctr"/>
+          <a:lstStyle/>
+          <a:p>
+            <a:pPr algn="ctr"/>
+            <a:r>
+              <a:rPr lang="en-GB" dirty="0"/>
+              <a:t>ArraySum.java</a:t>
+            </a:r>
+            <a:endParaRPr lang="en-US" dirty="0"/>
+          </a:p>
+        </p:txBody>
+      </p:sp>
+      <p:sp>
+        <p:nvSpPr>
+          <p:cNvPr id="13" name="Title 1"/>
+          <p:cNvSpPr>
+            <a:spLocks noGrp="1"/>
+          </p:cNvSpPr>
+          <p:nvPr>
+            <p:ph type="title"/>
+          </p:nvPr>
+        </p:nvSpPr>
+        <p:spPr>
+          <a:xfrm>
+            <a:off x="457200" y="274638"/>
+            <a:ext cx="8229600" cy="1143000"/>
+          </a:xfrm>
+        </p:spPr>
+        <p:txBody>
+          <a:bodyPr>
+            <a:normAutofit/>
+          </a:bodyPr>
+          <a:lstStyle/>
+          <a:p>
+            <a:pPr algn="l"/>
+            <a:r>
+              <a:rPr lang="en-GB" dirty="0" smtClean="0">
+                <a:solidFill>
+                  <a:schemeClr val="bg1">
+                    <a:lumMod val="50000"/>
+                  </a:schemeClr>
+                </a:solidFill>
+                <a:latin typeface="Comic Sans MS"/>
+                <a:cs typeface="Comic Sans MS"/>
+              </a:rPr>
+              <a:t>Vs </a:t>
+            </a:r>
+            <a:r>
+              <a:rPr lang="en-GB" dirty="0" err="1" smtClean="0">
+                <a:solidFill>
+                  <a:schemeClr val="bg1">
+                    <a:lumMod val="50000"/>
+                  </a:schemeClr>
+                </a:solidFill>
+                <a:latin typeface="Comic Sans MS"/>
+                <a:cs typeface="Comic Sans MS"/>
+              </a:rPr>
+              <a:t>Rootbeer</a:t>
+            </a:r>
+            <a:endParaRPr lang="en-US" dirty="0"/>
+          </a:p>
+        </p:txBody>
+      </p:sp>
+      <p:sp>
+        <p:nvSpPr>
+          <p:cNvPr id="10" name="Rectangle 9"/>
+          <p:cNvSpPr/>
+          <p:nvPr/>
+        </p:nvSpPr>
+        <p:spPr>
+          <a:xfrm>
+            <a:off x="457201" y="1750564"/>
+            <a:ext cx="4039644" cy="3970318"/>
+          </a:xfrm>
+          <a:prstGeom prst="rect">
+            <a:avLst/>
+          </a:prstGeom>
+        </p:spPr>
+        <p:style>
+          <a:lnRef idx="3">
+            <a:schemeClr val="lt1"/>
+          </a:lnRef>
+          <a:fillRef idx="1">
+            <a:schemeClr val="dk1"/>
+          </a:fillRef>
+          <a:effectRef idx="1">
+            <a:schemeClr val="dk1"/>
+          </a:effectRef>
+          <a:fontRef idx="minor">
+            <a:schemeClr val="lt1"/>
+          </a:fontRef>
+        </p:style>
+        <p:txBody>
+          <a:bodyPr wrap="square" rtlCol="0" anchor="t">
+            <a:spAutoFit/>
+          </a:bodyPr>
+          <a:lstStyle/>
+          <a:p>
+            <a:r>
+              <a:rPr lang="en-US" sz="1050" dirty="0">
+                <a:solidFill>
+                  <a:srgbClr val="92D050"/>
+                </a:solidFill>
+                <a:latin typeface="Courier New" panose="02070309020205020404" pitchFamily="49" charset="0"/>
+                <a:cs typeface="Courier New" panose="02070309020205020404" pitchFamily="49" charset="0"/>
+              </a:rPr>
+              <a:t>package </a:t>
+            </a:r>
+            <a:r>
+              <a:rPr lang="en-US" sz="1050" dirty="0" err="1">
+                <a:solidFill>
+                  <a:srgbClr val="92D050"/>
+                </a:solidFill>
+                <a:latin typeface="Courier New" panose="02070309020205020404" pitchFamily="49" charset="0"/>
+                <a:cs typeface="Courier New" panose="02070309020205020404" pitchFamily="49" charset="0"/>
+              </a:rPr>
+              <a:t>rootbeer.examples.arraysum</a:t>
+            </a:r>
+            <a:r>
+              <a:rPr lang="en-US" sz="1050" dirty="0">
+                <a:solidFill>
+                  <a:srgbClr val="92D050"/>
+                </a:solidFill>
+                <a:latin typeface="Courier New" panose="02070309020205020404" pitchFamily="49" charset="0"/>
+                <a:cs typeface="Courier New" panose="02070309020205020404" pitchFamily="49" charset="0"/>
+              </a:rPr>
+              <a:t>;</a:t>
+            </a:r>
+          </a:p>
+          <a:p>
+            <a:endParaRPr lang="en-US" sz="1050" dirty="0">
+              <a:solidFill>
+                <a:srgbClr val="92D050"/>
+              </a:solidFill>
+              <a:latin typeface="Courier New" panose="02070309020205020404" pitchFamily="49" charset="0"/>
+              <a:cs typeface="Courier New" panose="02070309020205020404" pitchFamily="49" charset="0"/>
+            </a:endParaRPr>
+          </a:p>
+          <a:p>
+            <a:r>
+              <a:rPr lang="en-US" sz="1050" dirty="0">
+                <a:solidFill>
+                  <a:srgbClr val="92D050"/>
+                </a:solidFill>
+                <a:latin typeface="Courier New" panose="02070309020205020404" pitchFamily="49" charset="0"/>
+                <a:cs typeface="Courier New" panose="02070309020205020404" pitchFamily="49" charset="0"/>
+              </a:rPr>
+              <a:t>import </a:t>
+            </a:r>
+            <a:r>
+              <a:rPr lang="en-US" sz="1050" dirty="0" err="1">
+                <a:solidFill>
+                  <a:srgbClr val="92D050"/>
+                </a:solidFill>
+                <a:latin typeface="Courier New" panose="02070309020205020404" pitchFamily="49" charset="0"/>
+                <a:cs typeface="Courier New" panose="02070309020205020404" pitchFamily="49" charset="0"/>
+              </a:rPr>
+              <a:t>java.util.List</a:t>
+            </a:r>
+            <a:r>
+              <a:rPr lang="en-US" sz="1050" dirty="0">
+                <a:solidFill>
+                  <a:srgbClr val="92D050"/>
+                </a:solidFill>
+                <a:latin typeface="Courier New" panose="02070309020205020404" pitchFamily="49" charset="0"/>
+                <a:cs typeface="Courier New" panose="02070309020205020404" pitchFamily="49" charset="0"/>
+              </a:rPr>
+              <a:t>;</a:t>
+            </a:r>
+          </a:p>
+          <a:p>
+            <a:r>
+              <a:rPr lang="en-US" sz="1050" dirty="0">
+                <a:solidFill>
+                  <a:srgbClr val="92D050"/>
+                </a:solidFill>
+                <a:latin typeface="Courier New" panose="02070309020205020404" pitchFamily="49" charset="0"/>
+                <a:cs typeface="Courier New" panose="02070309020205020404" pitchFamily="49" charset="0"/>
+              </a:rPr>
+              <a:t>import </a:t>
+            </a:r>
+            <a:r>
+              <a:rPr lang="en-US" sz="1050" dirty="0" err="1">
+                <a:solidFill>
+                  <a:srgbClr val="92D050"/>
+                </a:solidFill>
+                <a:latin typeface="Courier New" panose="02070309020205020404" pitchFamily="49" charset="0"/>
+                <a:cs typeface="Courier New" panose="02070309020205020404" pitchFamily="49" charset="0"/>
+              </a:rPr>
+              <a:t>java.util.ArrayList</a:t>
+            </a:r>
+            <a:r>
+              <a:rPr lang="en-US" sz="1050" dirty="0">
+                <a:solidFill>
+                  <a:srgbClr val="92D050"/>
+                </a:solidFill>
+                <a:latin typeface="Courier New" panose="02070309020205020404" pitchFamily="49" charset="0"/>
+                <a:cs typeface="Courier New" panose="02070309020205020404" pitchFamily="49" charset="0"/>
+              </a:rPr>
+              <a:t>;</a:t>
+            </a:r>
+          </a:p>
+          <a:p>
+            <a:r>
+              <a:rPr lang="en-US" sz="1050" b="1" i="1" dirty="0">
+                <a:solidFill>
+                  <a:schemeClr val="accent1"/>
+                </a:solidFill>
+                <a:latin typeface="Courier New" panose="02070309020205020404" pitchFamily="49" charset="0"/>
+                <a:cs typeface="Courier New" panose="02070309020205020404" pitchFamily="49" charset="0"/>
+              </a:rPr>
+              <a:t>import </a:t>
+            </a:r>
+            <a:r>
+              <a:rPr lang="en-US" sz="1050" b="1" i="1" dirty="0" err="1">
+                <a:solidFill>
+                  <a:schemeClr val="accent1"/>
+                </a:solidFill>
+                <a:latin typeface="Courier New" panose="02070309020205020404" pitchFamily="49" charset="0"/>
+                <a:cs typeface="Courier New" panose="02070309020205020404" pitchFamily="49" charset="0"/>
+              </a:rPr>
+              <a:t>org.trifort.rootbeer.runtime.Kernel</a:t>
+            </a:r>
+            <a:r>
+              <a:rPr lang="en-US" sz="1050" b="1" i="1" dirty="0">
+                <a:solidFill>
+                  <a:schemeClr val="accent1"/>
+                </a:solidFill>
+                <a:latin typeface="Courier New" panose="02070309020205020404" pitchFamily="49" charset="0"/>
+                <a:cs typeface="Courier New" panose="02070309020205020404" pitchFamily="49" charset="0"/>
+              </a:rPr>
+              <a:t>;</a:t>
+            </a:r>
+          </a:p>
+          <a:p>
+            <a:endParaRPr lang="en-US" sz="1050" dirty="0">
+              <a:solidFill>
+                <a:srgbClr val="92D050"/>
+              </a:solidFill>
+              <a:latin typeface="Courier New" panose="02070309020205020404" pitchFamily="49" charset="0"/>
+              <a:cs typeface="Courier New" panose="02070309020205020404" pitchFamily="49" charset="0"/>
+            </a:endParaRPr>
+          </a:p>
+          <a:p>
+            <a:r>
+              <a:rPr lang="en-US" sz="1050" dirty="0">
+                <a:solidFill>
+                  <a:srgbClr val="92D050"/>
+                </a:solidFill>
+                <a:latin typeface="Courier New" panose="02070309020205020404" pitchFamily="49" charset="0"/>
+                <a:cs typeface="Courier New" panose="02070309020205020404" pitchFamily="49" charset="0"/>
+              </a:rPr>
+              <a:t>public class </a:t>
+            </a:r>
+            <a:r>
+              <a:rPr lang="en-US" sz="1050" dirty="0" err="1">
+                <a:solidFill>
+                  <a:srgbClr val="92D050"/>
+                </a:solidFill>
+                <a:latin typeface="Courier New" panose="02070309020205020404" pitchFamily="49" charset="0"/>
+                <a:cs typeface="Courier New" panose="02070309020205020404" pitchFamily="49" charset="0"/>
+              </a:rPr>
+              <a:t>ArraySum</a:t>
+            </a:r>
+            <a:r>
+              <a:rPr lang="en-US" sz="1050" dirty="0">
+                <a:solidFill>
+                  <a:srgbClr val="92D050"/>
+                </a:solidFill>
+                <a:latin typeface="Courier New" panose="02070309020205020404" pitchFamily="49" charset="0"/>
+                <a:cs typeface="Courier New" panose="02070309020205020404" pitchFamily="49" charset="0"/>
+              </a:rPr>
+              <a:t> </a:t>
+            </a:r>
+            <a:r>
+              <a:rPr lang="en-US" sz="1050" b="1" i="1" dirty="0">
+                <a:solidFill>
+                  <a:schemeClr val="accent1"/>
+                </a:solidFill>
+                <a:latin typeface="Courier New" panose="02070309020205020404" pitchFamily="49" charset="0"/>
+                <a:cs typeface="Courier New" panose="02070309020205020404" pitchFamily="49" charset="0"/>
+              </a:rPr>
+              <a:t>implements Kernel </a:t>
+            </a:r>
+            <a:r>
+              <a:rPr lang="en-US" sz="1050" dirty="0">
+                <a:solidFill>
+                  <a:srgbClr val="92D050"/>
+                </a:solidFill>
+                <a:latin typeface="Courier New" panose="02070309020205020404" pitchFamily="49" charset="0"/>
+                <a:cs typeface="Courier New" panose="02070309020205020404" pitchFamily="49" charset="0"/>
+              </a:rPr>
+              <a:t>{</a:t>
+            </a:r>
+          </a:p>
+          <a:p>
+            <a:r>
+              <a:rPr lang="en-US" sz="1050" dirty="0">
+                <a:solidFill>
+                  <a:srgbClr val="92D050"/>
+                </a:solidFill>
+                <a:latin typeface="Courier New" panose="02070309020205020404" pitchFamily="49" charset="0"/>
+                <a:cs typeface="Courier New" panose="02070309020205020404" pitchFamily="49" charset="0"/>
+              </a:rPr>
+              <a:t>  </a:t>
+            </a:r>
+          </a:p>
+          <a:p>
+            <a:r>
+              <a:rPr lang="en-US" sz="1050" dirty="0">
+                <a:solidFill>
+                  <a:srgbClr val="92D050"/>
+                </a:solidFill>
+                <a:latin typeface="Courier New" panose="02070309020205020404" pitchFamily="49" charset="0"/>
+                <a:cs typeface="Courier New" panose="02070309020205020404" pitchFamily="49" charset="0"/>
+              </a:rPr>
+              <a:t>  private </a:t>
+            </a:r>
+            <a:r>
+              <a:rPr lang="en-US" sz="1050" dirty="0" err="1">
+                <a:solidFill>
+                  <a:srgbClr val="92D050"/>
+                </a:solidFill>
+                <a:latin typeface="Courier New" panose="02070309020205020404" pitchFamily="49" charset="0"/>
+                <a:cs typeface="Courier New" panose="02070309020205020404" pitchFamily="49" charset="0"/>
+              </a:rPr>
+              <a:t>int</a:t>
+            </a:r>
+            <a:r>
+              <a:rPr lang="en-US" sz="1050" dirty="0">
+                <a:solidFill>
+                  <a:srgbClr val="92D050"/>
+                </a:solidFill>
+                <a:latin typeface="Courier New" panose="02070309020205020404" pitchFamily="49" charset="0"/>
+                <a:cs typeface="Courier New" panose="02070309020205020404" pitchFamily="49" charset="0"/>
+              </a:rPr>
+              <a:t>[] source; </a:t>
+            </a:r>
+          </a:p>
+          <a:p>
+            <a:r>
+              <a:rPr lang="en-US" sz="1050" dirty="0">
+                <a:solidFill>
+                  <a:srgbClr val="92D050"/>
+                </a:solidFill>
+                <a:latin typeface="Courier New" panose="02070309020205020404" pitchFamily="49" charset="0"/>
+                <a:cs typeface="Courier New" panose="02070309020205020404" pitchFamily="49" charset="0"/>
+              </a:rPr>
+              <a:t>  private </a:t>
+            </a:r>
+            <a:r>
+              <a:rPr lang="en-US" sz="1050" dirty="0" err="1">
+                <a:solidFill>
+                  <a:srgbClr val="92D050"/>
+                </a:solidFill>
+                <a:latin typeface="Courier New" panose="02070309020205020404" pitchFamily="49" charset="0"/>
+                <a:cs typeface="Courier New" panose="02070309020205020404" pitchFamily="49" charset="0"/>
+              </a:rPr>
+              <a:t>int</a:t>
+            </a:r>
+            <a:r>
+              <a:rPr lang="en-US" sz="1050" dirty="0">
+                <a:solidFill>
+                  <a:srgbClr val="92D050"/>
+                </a:solidFill>
+                <a:latin typeface="Courier New" panose="02070309020205020404" pitchFamily="49" charset="0"/>
+                <a:cs typeface="Courier New" panose="02070309020205020404" pitchFamily="49" charset="0"/>
+              </a:rPr>
+              <a:t>[] ret; </a:t>
+            </a:r>
+          </a:p>
+          <a:p>
+            <a:r>
+              <a:rPr lang="en-US" sz="1050" dirty="0">
+                <a:solidFill>
+                  <a:srgbClr val="92D050"/>
+                </a:solidFill>
+                <a:latin typeface="Courier New" panose="02070309020205020404" pitchFamily="49" charset="0"/>
+                <a:cs typeface="Courier New" panose="02070309020205020404" pitchFamily="49" charset="0"/>
+              </a:rPr>
+              <a:t>  private </a:t>
+            </a:r>
+            <a:r>
+              <a:rPr lang="en-US" sz="1050" dirty="0" err="1">
+                <a:solidFill>
+                  <a:srgbClr val="92D050"/>
+                </a:solidFill>
+                <a:latin typeface="Courier New" panose="02070309020205020404" pitchFamily="49" charset="0"/>
+                <a:cs typeface="Courier New" panose="02070309020205020404" pitchFamily="49" charset="0"/>
+              </a:rPr>
+              <a:t>int</a:t>
+            </a:r>
+            <a:r>
+              <a:rPr lang="en-US" sz="1050" dirty="0">
+                <a:solidFill>
+                  <a:srgbClr val="92D050"/>
+                </a:solidFill>
+                <a:latin typeface="Courier New" panose="02070309020205020404" pitchFamily="49" charset="0"/>
+                <a:cs typeface="Courier New" panose="02070309020205020404" pitchFamily="49" charset="0"/>
+              </a:rPr>
+              <a:t> index;</a:t>
+            </a:r>
+          </a:p>
+          <a:p>
+            <a:r>
+              <a:rPr lang="en-US" sz="1050" dirty="0">
+                <a:solidFill>
+                  <a:srgbClr val="92D050"/>
+                </a:solidFill>
+                <a:latin typeface="Courier New" panose="02070309020205020404" pitchFamily="49" charset="0"/>
+                <a:cs typeface="Courier New" panose="02070309020205020404" pitchFamily="49" charset="0"/>
+              </a:rPr>
+              <a:t>  </a:t>
+            </a:r>
+          </a:p>
+          <a:p>
+            <a:r>
+              <a:rPr lang="en-US" sz="1050" dirty="0">
+                <a:solidFill>
+                  <a:srgbClr val="92D050"/>
+                </a:solidFill>
+                <a:latin typeface="Courier New" panose="02070309020205020404" pitchFamily="49" charset="0"/>
+                <a:cs typeface="Courier New" panose="02070309020205020404" pitchFamily="49" charset="0"/>
+              </a:rPr>
+              <a:t>  public </a:t>
+            </a:r>
+            <a:r>
+              <a:rPr lang="en-US" sz="1050" dirty="0" err="1">
+                <a:solidFill>
+                  <a:srgbClr val="92D050"/>
+                </a:solidFill>
+                <a:latin typeface="Courier New" panose="02070309020205020404" pitchFamily="49" charset="0"/>
+                <a:cs typeface="Courier New" panose="02070309020205020404" pitchFamily="49" charset="0"/>
+              </a:rPr>
+              <a:t>ArraySum</a:t>
+            </a:r>
+            <a:r>
+              <a:rPr lang="en-US" sz="1050" dirty="0">
+                <a:solidFill>
+                  <a:srgbClr val="92D050"/>
+                </a:solidFill>
+                <a:latin typeface="Courier New" panose="02070309020205020404" pitchFamily="49" charset="0"/>
+                <a:cs typeface="Courier New" panose="02070309020205020404" pitchFamily="49" charset="0"/>
+              </a:rPr>
+              <a:t> (</a:t>
+            </a:r>
+            <a:r>
+              <a:rPr lang="en-US" sz="1050" dirty="0" err="1">
+                <a:solidFill>
+                  <a:srgbClr val="92D050"/>
+                </a:solidFill>
+                <a:latin typeface="Courier New" panose="02070309020205020404" pitchFamily="49" charset="0"/>
+                <a:cs typeface="Courier New" panose="02070309020205020404" pitchFamily="49" charset="0"/>
+              </a:rPr>
+              <a:t>int</a:t>
+            </a:r>
+            <a:r>
+              <a:rPr lang="en-US" sz="1050" dirty="0">
+                <a:solidFill>
+                  <a:srgbClr val="92D050"/>
+                </a:solidFill>
+                <a:latin typeface="Courier New" panose="02070309020205020404" pitchFamily="49" charset="0"/>
+                <a:cs typeface="Courier New" panose="02070309020205020404" pitchFamily="49" charset="0"/>
+              </a:rPr>
+              <a:t>[] </a:t>
+            </a:r>
+            <a:r>
+              <a:rPr lang="en-US" sz="1050" dirty="0" err="1">
+                <a:solidFill>
+                  <a:srgbClr val="92D050"/>
+                </a:solidFill>
+                <a:latin typeface="Courier New" panose="02070309020205020404" pitchFamily="49" charset="0"/>
+                <a:cs typeface="Courier New" panose="02070309020205020404" pitchFamily="49" charset="0"/>
+              </a:rPr>
+              <a:t>src</a:t>
+            </a:r>
+            <a:r>
+              <a:rPr lang="en-US" sz="1050" dirty="0">
+                <a:solidFill>
+                  <a:srgbClr val="92D050"/>
+                </a:solidFill>
+                <a:latin typeface="Courier New" panose="02070309020205020404" pitchFamily="49" charset="0"/>
+                <a:cs typeface="Courier New" panose="02070309020205020404" pitchFamily="49" charset="0"/>
+              </a:rPr>
+              <a:t>, </a:t>
+            </a:r>
+            <a:r>
+              <a:rPr lang="en-US" sz="1050" dirty="0" err="1">
+                <a:solidFill>
+                  <a:srgbClr val="92D050"/>
+                </a:solidFill>
+                <a:latin typeface="Courier New" panose="02070309020205020404" pitchFamily="49" charset="0"/>
+                <a:cs typeface="Courier New" panose="02070309020205020404" pitchFamily="49" charset="0"/>
+              </a:rPr>
+              <a:t>int</a:t>
+            </a:r>
+            <a:r>
+              <a:rPr lang="en-US" sz="1050" dirty="0">
+                <a:solidFill>
+                  <a:srgbClr val="92D050"/>
+                </a:solidFill>
+                <a:latin typeface="Courier New" panose="02070309020205020404" pitchFamily="49" charset="0"/>
+                <a:cs typeface="Courier New" panose="02070309020205020404" pitchFamily="49" charset="0"/>
+              </a:rPr>
+              <a:t>[] </a:t>
+            </a:r>
+            <a:r>
+              <a:rPr lang="en-US" sz="1050" dirty="0" err="1">
+                <a:solidFill>
+                  <a:srgbClr val="92D050"/>
+                </a:solidFill>
+                <a:latin typeface="Courier New" panose="02070309020205020404" pitchFamily="49" charset="0"/>
+                <a:cs typeface="Courier New" panose="02070309020205020404" pitchFamily="49" charset="0"/>
+              </a:rPr>
+              <a:t>dst</a:t>
+            </a:r>
+            <a:r>
+              <a:rPr lang="en-US" sz="1050" dirty="0">
+                <a:solidFill>
+                  <a:srgbClr val="92D050"/>
+                </a:solidFill>
+                <a:latin typeface="Courier New" panose="02070309020205020404" pitchFamily="49" charset="0"/>
+                <a:cs typeface="Courier New" panose="02070309020205020404" pitchFamily="49" charset="0"/>
+              </a:rPr>
+              <a:t>, </a:t>
+            </a:r>
+            <a:r>
+              <a:rPr lang="en-US" sz="1050" dirty="0" err="1">
+                <a:solidFill>
+                  <a:srgbClr val="92D050"/>
+                </a:solidFill>
+                <a:latin typeface="Courier New" panose="02070309020205020404" pitchFamily="49" charset="0"/>
+                <a:cs typeface="Courier New" panose="02070309020205020404" pitchFamily="49" charset="0"/>
+              </a:rPr>
+              <a:t>int</a:t>
+            </a:r>
+            <a:r>
+              <a:rPr lang="en-US" sz="1050" dirty="0">
+                <a:solidFill>
+                  <a:srgbClr val="92D050"/>
+                </a:solidFill>
+                <a:latin typeface="Courier New" panose="02070309020205020404" pitchFamily="49" charset="0"/>
+                <a:cs typeface="Courier New" panose="02070309020205020404" pitchFamily="49" charset="0"/>
+              </a:rPr>
+              <a:t> </a:t>
+            </a:r>
+            <a:r>
+              <a:rPr lang="en-US" sz="1050" dirty="0" err="1">
+                <a:solidFill>
+                  <a:srgbClr val="92D050"/>
+                </a:solidFill>
+                <a:latin typeface="Courier New" panose="02070309020205020404" pitchFamily="49" charset="0"/>
+                <a:cs typeface="Courier New" panose="02070309020205020404" pitchFamily="49" charset="0"/>
+              </a:rPr>
+              <a:t>i</a:t>
+            </a:r>
+            <a:r>
+              <a:rPr lang="en-US" sz="1050" dirty="0">
+                <a:solidFill>
+                  <a:srgbClr val="92D050"/>
+                </a:solidFill>
+                <a:latin typeface="Courier New" panose="02070309020205020404" pitchFamily="49" charset="0"/>
+                <a:cs typeface="Courier New" panose="02070309020205020404" pitchFamily="49" charset="0"/>
+              </a:rPr>
+              <a:t>){</a:t>
+            </a:r>
+          </a:p>
+          <a:p>
+            <a:r>
+              <a:rPr lang="en-US" sz="1050" dirty="0">
+                <a:solidFill>
+                  <a:srgbClr val="92D050"/>
+                </a:solidFill>
+                <a:latin typeface="Courier New" panose="02070309020205020404" pitchFamily="49" charset="0"/>
+                <a:cs typeface="Courier New" panose="02070309020205020404" pitchFamily="49" charset="0"/>
+              </a:rPr>
+              <a:t>    source = </a:t>
+            </a:r>
+            <a:r>
+              <a:rPr lang="en-US" sz="1050" dirty="0" err="1">
+                <a:solidFill>
+                  <a:srgbClr val="92D050"/>
+                </a:solidFill>
+                <a:latin typeface="Courier New" panose="02070309020205020404" pitchFamily="49" charset="0"/>
+                <a:cs typeface="Courier New" panose="02070309020205020404" pitchFamily="49" charset="0"/>
+              </a:rPr>
+              <a:t>src</a:t>
+            </a:r>
+            <a:r>
+              <a:rPr lang="en-US" sz="1050" dirty="0">
+                <a:solidFill>
+                  <a:srgbClr val="92D050"/>
+                </a:solidFill>
+                <a:latin typeface="Courier New" panose="02070309020205020404" pitchFamily="49" charset="0"/>
+                <a:cs typeface="Courier New" panose="02070309020205020404" pitchFamily="49" charset="0"/>
+              </a:rPr>
+              <a:t>; ret = </a:t>
+            </a:r>
+            <a:r>
+              <a:rPr lang="en-US" sz="1050" dirty="0" err="1">
+                <a:solidFill>
+                  <a:srgbClr val="92D050"/>
+                </a:solidFill>
+                <a:latin typeface="Courier New" panose="02070309020205020404" pitchFamily="49" charset="0"/>
+                <a:cs typeface="Courier New" panose="02070309020205020404" pitchFamily="49" charset="0"/>
+              </a:rPr>
+              <a:t>dst</a:t>
+            </a:r>
+            <a:r>
+              <a:rPr lang="en-US" sz="1050" dirty="0">
+                <a:solidFill>
+                  <a:srgbClr val="92D050"/>
+                </a:solidFill>
+                <a:latin typeface="Courier New" panose="02070309020205020404" pitchFamily="49" charset="0"/>
+                <a:cs typeface="Courier New" panose="02070309020205020404" pitchFamily="49" charset="0"/>
+              </a:rPr>
+              <a:t>; index = </a:t>
+            </a:r>
+            <a:r>
+              <a:rPr lang="en-US" sz="1050" dirty="0" err="1">
+                <a:solidFill>
+                  <a:srgbClr val="92D050"/>
+                </a:solidFill>
+                <a:latin typeface="Courier New" panose="02070309020205020404" pitchFamily="49" charset="0"/>
+                <a:cs typeface="Courier New" panose="02070309020205020404" pitchFamily="49" charset="0"/>
+              </a:rPr>
+              <a:t>i</a:t>
+            </a:r>
+            <a:r>
+              <a:rPr lang="en-US" sz="1050" dirty="0">
+                <a:solidFill>
+                  <a:srgbClr val="92D050"/>
+                </a:solidFill>
+                <a:latin typeface="Courier New" panose="02070309020205020404" pitchFamily="49" charset="0"/>
+                <a:cs typeface="Courier New" panose="02070309020205020404" pitchFamily="49" charset="0"/>
+              </a:rPr>
+              <a:t>;</a:t>
+            </a:r>
+          </a:p>
+          <a:p>
+            <a:r>
+              <a:rPr lang="en-US" sz="1050" dirty="0">
+                <a:solidFill>
+                  <a:srgbClr val="92D050"/>
+                </a:solidFill>
+                <a:latin typeface="Courier New" panose="02070309020205020404" pitchFamily="49" charset="0"/>
+                <a:cs typeface="Courier New" panose="02070309020205020404" pitchFamily="49" charset="0"/>
+              </a:rPr>
+              <a:t>  }</a:t>
+            </a:r>
+          </a:p>
+          <a:p>
+            <a:r>
+              <a:rPr lang="en-US" sz="1050" dirty="0">
+                <a:solidFill>
+                  <a:srgbClr val="92D050"/>
+                </a:solidFill>
+                <a:latin typeface="Courier New" panose="02070309020205020404" pitchFamily="49" charset="0"/>
+                <a:cs typeface="Courier New" panose="02070309020205020404" pitchFamily="49" charset="0"/>
+              </a:rPr>
+              <a:t>  </a:t>
+            </a:r>
+          </a:p>
+          <a:p>
+            <a:r>
+              <a:rPr lang="en-US" sz="1050" dirty="0">
+                <a:solidFill>
+                  <a:srgbClr val="92D050"/>
+                </a:solidFill>
+                <a:latin typeface="Courier New" panose="02070309020205020404" pitchFamily="49" charset="0"/>
+                <a:cs typeface="Courier New" panose="02070309020205020404" pitchFamily="49" charset="0"/>
+              </a:rPr>
+              <a:t>  </a:t>
+            </a:r>
+            <a:r>
+              <a:rPr lang="en-US" sz="1050" b="1" i="1" dirty="0">
+                <a:solidFill>
+                  <a:schemeClr val="accent1"/>
+                </a:solidFill>
+                <a:latin typeface="Courier New" panose="02070309020205020404" pitchFamily="49" charset="0"/>
+                <a:cs typeface="Courier New" panose="02070309020205020404" pitchFamily="49" charset="0"/>
+              </a:rPr>
+              <a:t>public void </a:t>
+            </a:r>
+            <a:r>
+              <a:rPr lang="en-US" sz="1050" b="1" i="1" dirty="0" err="1">
+                <a:solidFill>
+                  <a:schemeClr val="accent1"/>
+                </a:solidFill>
+                <a:latin typeface="Courier New" panose="02070309020205020404" pitchFamily="49" charset="0"/>
+                <a:cs typeface="Courier New" panose="02070309020205020404" pitchFamily="49" charset="0"/>
+              </a:rPr>
+              <a:t>gpuMethod</a:t>
+            </a:r>
+            <a:r>
+              <a:rPr lang="en-US" sz="1050" b="1" i="1" dirty="0">
+                <a:solidFill>
+                  <a:schemeClr val="accent1"/>
+                </a:solidFill>
+                <a:latin typeface="Courier New" panose="02070309020205020404" pitchFamily="49" charset="0"/>
+                <a:cs typeface="Courier New" panose="02070309020205020404" pitchFamily="49" charset="0"/>
+              </a:rPr>
+              <a:t>(){</a:t>
+            </a:r>
+          </a:p>
+          <a:p>
+            <a:r>
+              <a:rPr lang="en-US" sz="1050" dirty="0">
+                <a:solidFill>
+                  <a:srgbClr val="92D050"/>
+                </a:solidFill>
+                <a:latin typeface="Courier New" panose="02070309020205020404" pitchFamily="49" charset="0"/>
+                <a:cs typeface="Courier New" panose="02070309020205020404" pitchFamily="49" charset="0"/>
+              </a:rPr>
+              <a:t>    </a:t>
+            </a:r>
+            <a:r>
+              <a:rPr lang="en-US" sz="1050" dirty="0" err="1">
+                <a:solidFill>
+                  <a:srgbClr val="92D050"/>
+                </a:solidFill>
+                <a:latin typeface="Courier New" panose="02070309020205020404" pitchFamily="49" charset="0"/>
+                <a:cs typeface="Courier New" panose="02070309020205020404" pitchFamily="49" charset="0"/>
+              </a:rPr>
+              <a:t>int</a:t>
+            </a:r>
+            <a:r>
+              <a:rPr lang="en-US" sz="1050" dirty="0">
+                <a:solidFill>
+                  <a:srgbClr val="92D050"/>
+                </a:solidFill>
+                <a:latin typeface="Courier New" panose="02070309020205020404" pitchFamily="49" charset="0"/>
+                <a:cs typeface="Courier New" panose="02070309020205020404" pitchFamily="49" charset="0"/>
+              </a:rPr>
+              <a:t> sum = 0;</a:t>
+            </a:r>
+          </a:p>
+          <a:p>
+            <a:r>
+              <a:rPr lang="en-US" sz="1050" dirty="0">
+                <a:solidFill>
+                  <a:srgbClr val="92D050"/>
+                </a:solidFill>
+                <a:latin typeface="Courier New" panose="02070309020205020404" pitchFamily="49" charset="0"/>
+                <a:cs typeface="Courier New" panose="02070309020205020404" pitchFamily="49" charset="0"/>
+              </a:rPr>
+              <a:t>    for(</a:t>
+            </a:r>
+            <a:r>
+              <a:rPr lang="en-US" sz="1050" dirty="0" err="1">
+                <a:solidFill>
+                  <a:srgbClr val="92D050"/>
+                </a:solidFill>
+                <a:latin typeface="Courier New" panose="02070309020205020404" pitchFamily="49" charset="0"/>
+                <a:cs typeface="Courier New" panose="02070309020205020404" pitchFamily="49" charset="0"/>
+              </a:rPr>
+              <a:t>int</a:t>
+            </a:r>
+            <a:r>
+              <a:rPr lang="en-US" sz="1050" dirty="0">
+                <a:solidFill>
+                  <a:srgbClr val="92D050"/>
+                </a:solidFill>
+                <a:latin typeface="Courier New" panose="02070309020205020404" pitchFamily="49" charset="0"/>
+                <a:cs typeface="Courier New" panose="02070309020205020404" pitchFamily="49" charset="0"/>
+              </a:rPr>
+              <a:t> </a:t>
+            </a:r>
+            <a:r>
+              <a:rPr lang="en-US" sz="1050" dirty="0" err="1">
+                <a:solidFill>
+                  <a:srgbClr val="92D050"/>
+                </a:solidFill>
+                <a:latin typeface="Courier New" panose="02070309020205020404" pitchFamily="49" charset="0"/>
+                <a:cs typeface="Courier New" panose="02070309020205020404" pitchFamily="49" charset="0"/>
+              </a:rPr>
+              <a:t>i</a:t>
+            </a:r>
+            <a:r>
+              <a:rPr lang="en-US" sz="1050" dirty="0">
+                <a:solidFill>
+                  <a:srgbClr val="92D050"/>
+                </a:solidFill>
+                <a:latin typeface="Courier New" panose="02070309020205020404" pitchFamily="49" charset="0"/>
+                <a:cs typeface="Courier New" panose="02070309020205020404" pitchFamily="49" charset="0"/>
+              </a:rPr>
+              <a:t> = 0; </a:t>
+            </a:r>
+            <a:r>
+              <a:rPr lang="en-US" sz="1050" dirty="0" err="1">
+                <a:solidFill>
+                  <a:srgbClr val="92D050"/>
+                </a:solidFill>
+                <a:latin typeface="Courier New" panose="02070309020205020404" pitchFamily="49" charset="0"/>
+                <a:cs typeface="Courier New" panose="02070309020205020404" pitchFamily="49" charset="0"/>
+              </a:rPr>
+              <a:t>i</a:t>
+            </a:r>
+            <a:r>
+              <a:rPr lang="en-US" sz="1050" dirty="0">
+                <a:solidFill>
+                  <a:srgbClr val="92D050"/>
+                </a:solidFill>
+                <a:latin typeface="Courier New" panose="02070309020205020404" pitchFamily="49" charset="0"/>
+                <a:cs typeface="Courier New" panose="02070309020205020404" pitchFamily="49" charset="0"/>
+              </a:rPr>
+              <a:t> &lt; </a:t>
+            </a:r>
+            <a:r>
+              <a:rPr lang="en-US" sz="1050" dirty="0" err="1">
+                <a:solidFill>
+                  <a:srgbClr val="92D050"/>
+                </a:solidFill>
+                <a:latin typeface="Courier New" panose="02070309020205020404" pitchFamily="49" charset="0"/>
+                <a:cs typeface="Courier New" panose="02070309020205020404" pitchFamily="49" charset="0"/>
+              </a:rPr>
+              <a:t>source.length</a:t>
+            </a:r>
+            <a:r>
+              <a:rPr lang="en-US" sz="1050" dirty="0">
+                <a:solidFill>
+                  <a:srgbClr val="92D050"/>
+                </a:solidFill>
+                <a:latin typeface="Courier New" panose="02070309020205020404" pitchFamily="49" charset="0"/>
+                <a:cs typeface="Courier New" panose="02070309020205020404" pitchFamily="49" charset="0"/>
+              </a:rPr>
+              <a:t>; ++</a:t>
+            </a:r>
+            <a:r>
+              <a:rPr lang="en-US" sz="1050" dirty="0" err="1">
+                <a:solidFill>
+                  <a:srgbClr val="92D050"/>
+                </a:solidFill>
+                <a:latin typeface="Courier New" panose="02070309020205020404" pitchFamily="49" charset="0"/>
+                <a:cs typeface="Courier New" panose="02070309020205020404" pitchFamily="49" charset="0"/>
+              </a:rPr>
+              <a:t>i</a:t>
+            </a:r>
+            <a:r>
+              <a:rPr lang="en-US" sz="1050" dirty="0">
+                <a:solidFill>
+                  <a:srgbClr val="92D050"/>
+                </a:solidFill>
+                <a:latin typeface="Courier New" panose="02070309020205020404" pitchFamily="49" charset="0"/>
+                <a:cs typeface="Courier New" panose="02070309020205020404" pitchFamily="49" charset="0"/>
+              </a:rPr>
+              <a:t>){</a:t>
+            </a:r>
+          </a:p>
+          <a:p>
+            <a:r>
+              <a:rPr lang="en-US" sz="1050" dirty="0">
+                <a:solidFill>
+                  <a:srgbClr val="92D050"/>
+                </a:solidFill>
+                <a:latin typeface="Courier New" panose="02070309020205020404" pitchFamily="49" charset="0"/>
+                <a:cs typeface="Courier New" panose="02070309020205020404" pitchFamily="49" charset="0"/>
+              </a:rPr>
+              <a:t>      sum += source[</a:t>
+            </a:r>
+            <a:r>
+              <a:rPr lang="en-US" sz="1050" dirty="0" err="1">
+                <a:solidFill>
+                  <a:srgbClr val="92D050"/>
+                </a:solidFill>
+                <a:latin typeface="Courier New" panose="02070309020205020404" pitchFamily="49" charset="0"/>
+                <a:cs typeface="Courier New" panose="02070309020205020404" pitchFamily="49" charset="0"/>
+              </a:rPr>
+              <a:t>i</a:t>
+            </a:r>
+            <a:r>
+              <a:rPr lang="en-US" sz="1050" dirty="0">
+                <a:solidFill>
+                  <a:srgbClr val="92D050"/>
+                </a:solidFill>
+                <a:latin typeface="Courier New" panose="02070309020205020404" pitchFamily="49" charset="0"/>
+                <a:cs typeface="Courier New" panose="02070309020205020404" pitchFamily="49" charset="0"/>
+              </a:rPr>
+              <a:t>];</a:t>
+            </a:r>
+          </a:p>
+          <a:p>
+            <a:r>
+              <a:rPr lang="en-US" sz="1050" dirty="0">
+                <a:solidFill>
+                  <a:srgbClr val="92D050"/>
+                </a:solidFill>
+                <a:latin typeface="Courier New" panose="02070309020205020404" pitchFamily="49" charset="0"/>
+                <a:cs typeface="Courier New" panose="02070309020205020404" pitchFamily="49" charset="0"/>
+              </a:rPr>
+              <a:t>    }</a:t>
+            </a:r>
+          </a:p>
+          <a:p>
+            <a:r>
+              <a:rPr lang="en-US" sz="1050" dirty="0">
+                <a:solidFill>
+                  <a:srgbClr val="92D050"/>
+                </a:solidFill>
+                <a:latin typeface="Courier New" panose="02070309020205020404" pitchFamily="49" charset="0"/>
+                <a:cs typeface="Courier New" panose="02070309020205020404" pitchFamily="49" charset="0"/>
+              </a:rPr>
+              <a:t>    ret[index] = sum;</a:t>
+            </a:r>
+          </a:p>
+          <a:p>
+            <a:r>
+              <a:rPr lang="en-US" sz="1050" dirty="0">
+                <a:solidFill>
+                  <a:srgbClr val="92D050"/>
+                </a:solidFill>
+                <a:latin typeface="Courier New" panose="02070309020205020404" pitchFamily="49" charset="0"/>
+                <a:cs typeface="Courier New" panose="02070309020205020404" pitchFamily="49" charset="0"/>
+              </a:rPr>
+              <a:t> </a:t>
+            </a:r>
+            <a:r>
+              <a:rPr lang="en-US" sz="1050" dirty="0">
+                <a:solidFill>
+                  <a:schemeClr val="accent1"/>
+                </a:solidFill>
+                <a:latin typeface="Courier New" panose="02070309020205020404" pitchFamily="49" charset="0"/>
+                <a:cs typeface="Courier New" panose="02070309020205020404" pitchFamily="49" charset="0"/>
+              </a:rPr>
+              <a:t> </a:t>
+            </a:r>
+            <a:r>
+              <a:rPr lang="en-US" sz="1050" b="1" i="1" dirty="0">
+                <a:solidFill>
+                  <a:schemeClr val="accent1"/>
+                </a:solidFill>
+                <a:latin typeface="Courier New" panose="02070309020205020404" pitchFamily="49" charset="0"/>
+                <a:cs typeface="Courier New" panose="02070309020205020404" pitchFamily="49" charset="0"/>
+              </a:rPr>
+              <a:t>}</a:t>
+            </a:r>
+          </a:p>
+          <a:p>
+            <a:r>
+              <a:rPr lang="en-US" sz="1050" dirty="0">
+                <a:solidFill>
+                  <a:srgbClr val="92D050"/>
+                </a:solidFill>
+                <a:latin typeface="Courier New" panose="02070309020205020404" pitchFamily="49" charset="0"/>
+                <a:cs typeface="Courier New" panose="02070309020205020404" pitchFamily="49" charset="0"/>
+              </a:rPr>
+              <a:t>}</a:t>
+            </a:r>
+            <a:endParaRPr lang="en-US" sz="1050" dirty="0">
+              <a:solidFill>
+                <a:srgbClr val="92D050"/>
+              </a:solidFill>
+              <a:latin typeface="Courier New" panose="02070309020205020404" pitchFamily="49" charset="0"/>
+              <a:cs typeface="Courier New" panose="02070309020205020404" pitchFamily="49" charset="0"/>
+            </a:endParaRPr>
+          </a:p>
+        </p:txBody>
+      </p:sp>
+      <p:sp>
+        <p:nvSpPr>
+          <p:cNvPr id="12" name="Rectangle 11"/>
+          <p:cNvSpPr/>
+          <p:nvPr/>
+        </p:nvSpPr>
+        <p:spPr>
+          <a:xfrm>
+            <a:off x="4496845" y="4253"/>
+            <a:ext cx="3045448" cy="360040"/>
+          </a:xfrm>
+          <a:prstGeom prst="rect">
+            <a:avLst/>
+          </a:prstGeom>
+        </p:spPr>
+        <p:style>
+          <a:lnRef idx="2">
+            <a:schemeClr val="accent1"/>
+          </a:lnRef>
+          <a:fillRef idx="1">
+            <a:schemeClr val="lt1"/>
+          </a:fillRef>
+          <a:effectRef idx="0">
+            <a:schemeClr val="accent1"/>
+          </a:effectRef>
+          <a:fontRef idx="minor">
+            <a:schemeClr val="dk1"/>
+          </a:fontRef>
+        </p:style>
+        <p:txBody>
+          <a:bodyPr rtlCol="0" anchor="ctr"/>
+          <a:lstStyle/>
+          <a:p>
+            <a:pPr algn="ctr"/>
+            <a:r>
+              <a:rPr lang="en-GB" dirty="0" smtClean="0"/>
+              <a:t>ArraySumApp.java</a:t>
+            </a:r>
+            <a:endParaRPr lang="en-US" dirty="0"/>
+          </a:p>
+        </p:txBody>
+      </p:sp>
+      <p:sp>
+        <p:nvSpPr>
+          <p:cNvPr id="15" name="Rectangle 14"/>
+          <p:cNvSpPr/>
+          <p:nvPr/>
+        </p:nvSpPr>
+        <p:spPr>
+          <a:xfrm>
+            <a:off x="4496845" y="338197"/>
+            <a:ext cx="4039644" cy="6186309"/>
+          </a:xfrm>
+          <a:prstGeom prst="rect">
+            <a:avLst/>
+          </a:prstGeom>
+        </p:spPr>
+        <p:style>
+          <a:lnRef idx="3">
+            <a:schemeClr val="lt1"/>
+          </a:lnRef>
+          <a:fillRef idx="1">
+            <a:schemeClr val="dk1"/>
+          </a:fillRef>
+          <a:effectRef idx="1">
+            <a:schemeClr val="dk1"/>
+          </a:effectRef>
+          <a:fontRef idx="minor">
+            <a:schemeClr val="lt1"/>
+          </a:fontRef>
+        </p:style>
+        <p:txBody>
+          <a:bodyPr wrap="square" rtlCol="0" anchor="t">
+            <a:spAutoFit/>
+          </a:bodyPr>
+          <a:lstStyle/>
+          <a:p>
+            <a:r>
+              <a:rPr lang="en-US" sz="900" dirty="0">
+                <a:solidFill>
+                  <a:srgbClr val="92D050"/>
+                </a:solidFill>
+                <a:latin typeface="Courier New" panose="02070309020205020404" pitchFamily="49" charset="0"/>
+                <a:cs typeface="Courier New" panose="02070309020205020404" pitchFamily="49" charset="0"/>
+              </a:rPr>
+              <a:t>package </a:t>
+            </a:r>
+            <a:r>
+              <a:rPr lang="en-US" sz="900" dirty="0" err="1">
+                <a:solidFill>
+                  <a:srgbClr val="92D050"/>
+                </a:solidFill>
+                <a:latin typeface="Courier New" panose="02070309020205020404" pitchFamily="49" charset="0"/>
+                <a:cs typeface="Courier New" panose="02070309020205020404" pitchFamily="49" charset="0"/>
+              </a:rPr>
+              <a:t>rootbeer.examples.arraysum</a:t>
+            </a:r>
+            <a:r>
+              <a:rPr lang="en-US" sz="900" dirty="0">
+                <a:solidFill>
+                  <a:srgbClr val="92D050"/>
+                </a:solidFill>
+                <a:latin typeface="Courier New" panose="02070309020205020404" pitchFamily="49" charset="0"/>
+                <a:cs typeface="Courier New" panose="02070309020205020404" pitchFamily="49" charset="0"/>
+              </a:rPr>
+              <a:t>;</a:t>
+            </a:r>
+          </a:p>
+          <a:p>
+            <a:endParaRPr lang="en-US" sz="900" dirty="0">
+              <a:solidFill>
+                <a:srgbClr val="92D050"/>
+              </a:solidFill>
+              <a:latin typeface="Courier New" panose="02070309020205020404" pitchFamily="49" charset="0"/>
+              <a:cs typeface="Courier New" panose="02070309020205020404" pitchFamily="49" charset="0"/>
+            </a:endParaRPr>
+          </a:p>
+          <a:p>
+            <a:r>
+              <a:rPr lang="en-US" sz="900" dirty="0">
+                <a:solidFill>
+                  <a:srgbClr val="92D050"/>
+                </a:solidFill>
+                <a:latin typeface="Courier New" panose="02070309020205020404" pitchFamily="49" charset="0"/>
+                <a:cs typeface="Courier New" panose="02070309020205020404" pitchFamily="49" charset="0"/>
+              </a:rPr>
+              <a:t>import </a:t>
+            </a:r>
+            <a:r>
+              <a:rPr lang="en-US" sz="900" dirty="0" err="1">
+                <a:solidFill>
+                  <a:srgbClr val="92D050"/>
+                </a:solidFill>
+                <a:latin typeface="Courier New" panose="02070309020205020404" pitchFamily="49" charset="0"/>
+                <a:cs typeface="Courier New" panose="02070309020205020404" pitchFamily="49" charset="0"/>
+              </a:rPr>
+              <a:t>java.util.List</a:t>
+            </a:r>
+            <a:r>
+              <a:rPr lang="en-US" sz="900" dirty="0">
+                <a:solidFill>
+                  <a:srgbClr val="92D050"/>
+                </a:solidFill>
+                <a:latin typeface="Courier New" panose="02070309020205020404" pitchFamily="49" charset="0"/>
+                <a:cs typeface="Courier New" panose="02070309020205020404" pitchFamily="49" charset="0"/>
+              </a:rPr>
+              <a:t>;</a:t>
+            </a:r>
+          </a:p>
+          <a:p>
+            <a:r>
+              <a:rPr lang="en-US" sz="900" dirty="0">
+                <a:solidFill>
+                  <a:srgbClr val="92D050"/>
+                </a:solidFill>
+                <a:latin typeface="Courier New" panose="02070309020205020404" pitchFamily="49" charset="0"/>
+                <a:cs typeface="Courier New" panose="02070309020205020404" pitchFamily="49" charset="0"/>
+              </a:rPr>
+              <a:t>import </a:t>
+            </a:r>
+            <a:r>
+              <a:rPr lang="en-US" sz="900" dirty="0" err="1">
+                <a:solidFill>
+                  <a:srgbClr val="92D050"/>
+                </a:solidFill>
+                <a:latin typeface="Courier New" panose="02070309020205020404" pitchFamily="49" charset="0"/>
+                <a:cs typeface="Courier New" panose="02070309020205020404" pitchFamily="49" charset="0"/>
+              </a:rPr>
+              <a:t>java.util.ArrayList</a:t>
+            </a:r>
+            <a:r>
+              <a:rPr lang="en-US" sz="900" dirty="0">
+                <a:solidFill>
+                  <a:srgbClr val="92D050"/>
+                </a:solidFill>
+                <a:latin typeface="Courier New" panose="02070309020205020404" pitchFamily="49" charset="0"/>
+                <a:cs typeface="Courier New" panose="02070309020205020404" pitchFamily="49" charset="0"/>
+              </a:rPr>
+              <a:t>;</a:t>
+            </a:r>
+          </a:p>
+          <a:p>
+            <a:r>
+              <a:rPr lang="en-US" sz="900" b="1" i="1" dirty="0">
+                <a:solidFill>
+                  <a:schemeClr val="accent1"/>
+                </a:solidFill>
+                <a:latin typeface="Courier New" panose="02070309020205020404" pitchFamily="49" charset="0"/>
+                <a:cs typeface="Courier New" panose="02070309020205020404" pitchFamily="49" charset="0"/>
+              </a:rPr>
+              <a:t>import </a:t>
+            </a:r>
+            <a:r>
+              <a:rPr lang="en-US" sz="900" b="1" i="1" dirty="0" err="1">
+                <a:solidFill>
+                  <a:schemeClr val="accent1"/>
+                </a:solidFill>
+                <a:latin typeface="Courier New" panose="02070309020205020404" pitchFamily="49" charset="0"/>
+                <a:cs typeface="Courier New" panose="02070309020205020404" pitchFamily="49" charset="0"/>
+              </a:rPr>
+              <a:t>org.trifort.rootbeer.runtime.Kernel</a:t>
+            </a:r>
+            <a:r>
+              <a:rPr lang="en-US" sz="900" b="1" i="1" dirty="0">
+                <a:solidFill>
+                  <a:schemeClr val="accent1"/>
+                </a:solidFill>
+                <a:latin typeface="Courier New" panose="02070309020205020404" pitchFamily="49" charset="0"/>
+                <a:cs typeface="Courier New" panose="02070309020205020404" pitchFamily="49" charset="0"/>
+              </a:rPr>
+              <a:t>;</a:t>
+            </a:r>
+          </a:p>
+          <a:p>
+            <a:r>
+              <a:rPr lang="en-US" sz="900" b="1" i="1" dirty="0">
+                <a:solidFill>
+                  <a:schemeClr val="accent1"/>
+                </a:solidFill>
+                <a:latin typeface="Courier New" panose="02070309020205020404" pitchFamily="49" charset="0"/>
+                <a:cs typeface="Courier New" panose="02070309020205020404" pitchFamily="49" charset="0"/>
+              </a:rPr>
+              <a:t>import </a:t>
+            </a:r>
+            <a:r>
+              <a:rPr lang="en-US" sz="900" b="1" i="1" dirty="0" err="1">
+                <a:solidFill>
+                  <a:schemeClr val="accent1"/>
+                </a:solidFill>
+                <a:latin typeface="Courier New" panose="02070309020205020404" pitchFamily="49" charset="0"/>
+                <a:cs typeface="Courier New" panose="02070309020205020404" pitchFamily="49" charset="0"/>
+              </a:rPr>
+              <a:t>org.trifort.rootbeer.runtime.Rootbeer</a:t>
+            </a:r>
+            <a:r>
+              <a:rPr lang="en-US" sz="900" b="1" i="1" dirty="0">
+                <a:solidFill>
+                  <a:schemeClr val="accent1"/>
+                </a:solidFill>
+                <a:latin typeface="Courier New" panose="02070309020205020404" pitchFamily="49" charset="0"/>
+                <a:cs typeface="Courier New" panose="02070309020205020404" pitchFamily="49" charset="0"/>
+              </a:rPr>
+              <a:t>;</a:t>
+            </a:r>
+          </a:p>
+          <a:p>
+            <a:r>
+              <a:rPr lang="en-US" sz="900" b="1" i="1" dirty="0">
+                <a:solidFill>
+                  <a:schemeClr val="accent1"/>
+                </a:solidFill>
+                <a:latin typeface="Courier New" panose="02070309020205020404" pitchFamily="49" charset="0"/>
+                <a:cs typeface="Courier New" panose="02070309020205020404" pitchFamily="49" charset="0"/>
+              </a:rPr>
+              <a:t>import </a:t>
+            </a:r>
+            <a:r>
+              <a:rPr lang="en-US" sz="900" b="1" i="1" dirty="0" err="1">
+                <a:solidFill>
+                  <a:schemeClr val="accent1"/>
+                </a:solidFill>
+                <a:latin typeface="Courier New" panose="02070309020205020404" pitchFamily="49" charset="0"/>
+                <a:cs typeface="Courier New" panose="02070309020205020404" pitchFamily="49" charset="0"/>
+              </a:rPr>
+              <a:t>org.trifort.rootbeer.runtime.Context</a:t>
+            </a:r>
+            <a:r>
+              <a:rPr lang="en-US" sz="900" b="1" i="1" dirty="0">
+                <a:solidFill>
+                  <a:schemeClr val="accent1"/>
+                </a:solidFill>
+                <a:latin typeface="Courier New" panose="02070309020205020404" pitchFamily="49" charset="0"/>
+                <a:cs typeface="Courier New" panose="02070309020205020404" pitchFamily="49" charset="0"/>
+              </a:rPr>
+              <a:t>;</a:t>
+            </a:r>
+          </a:p>
+          <a:p>
+            <a:endParaRPr lang="en-US" sz="900" dirty="0">
+              <a:solidFill>
+                <a:srgbClr val="92D050"/>
+              </a:solidFill>
+              <a:latin typeface="Courier New" panose="02070309020205020404" pitchFamily="49" charset="0"/>
+              <a:cs typeface="Courier New" panose="02070309020205020404" pitchFamily="49" charset="0"/>
+            </a:endParaRPr>
+          </a:p>
+          <a:p>
+            <a:r>
+              <a:rPr lang="en-US" sz="900" dirty="0">
+                <a:solidFill>
+                  <a:srgbClr val="92D050"/>
+                </a:solidFill>
+                <a:latin typeface="Courier New" panose="02070309020205020404" pitchFamily="49" charset="0"/>
+                <a:cs typeface="Courier New" panose="02070309020205020404" pitchFamily="49" charset="0"/>
+              </a:rPr>
+              <a:t>public class </a:t>
+            </a:r>
+            <a:r>
+              <a:rPr lang="en-US" sz="900" dirty="0" err="1">
+                <a:solidFill>
+                  <a:srgbClr val="92D050"/>
+                </a:solidFill>
+                <a:latin typeface="Courier New" panose="02070309020205020404" pitchFamily="49" charset="0"/>
+                <a:cs typeface="Courier New" panose="02070309020205020404" pitchFamily="49" charset="0"/>
+              </a:rPr>
+              <a:t>ArraySumApp</a:t>
+            </a:r>
+            <a:r>
+              <a:rPr lang="en-US" sz="900" dirty="0">
+                <a:solidFill>
+                  <a:srgbClr val="92D050"/>
+                </a:solidFill>
+                <a:latin typeface="Courier New" panose="02070309020205020404" pitchFamily="49" charset="0"/>
+                <a:cs typeface="Courier New" panose="02070309020205020404" pitchFamily="49" charset="0"/>
+              </a:rPr>
+              <a:t> {</a:t>
+            </a:r>
+          </a:p>
+          <a:p>
+            <a:endParaRPr lang="en-US" sz="900" dirty="0">
+              <a:solidFill>
+                <a:srgbClr val="92D050"/>
+              </a:solidFill>
+              <a:latin typeface="Courier New" panose="02070309020205020404" pitchFamily="49" charset="0"/>
+              <a:cs typeface="Courier New" panose="02070309020205020404" pitchFamily="49" charset="0"/>
+            </a:endParaRPr>
+          </a:p>
+          <a:p>
+            <a:r>
+              <a:rPr lang="en-US" sz="900" dirty="0">
+                <a:solidFill>
+                  <a:srgbClr val="92D050"/>
+                </a:solidFill>
+                <a:latin typeface="Courier New" panose="02070309020205020404" pitchFamily="49" charset="0"/>
+                <a:cs typeface="Courier New" panose="02070309020205020404" pitchFamily="49" charset="0"/>
+              </a:rPr>
+              <a:t>  public </a:t>
+            </a:r>
+            <a:r>
+              <a:rPr lang="en-US" sz="900" dirty="0" err="1">
+                <a:solidFill>
+                  <a:srgbClr val="92D050"/>
+                </a:solidFill>
+                <a:latin typeface="Courier New" panose="02070309020205020404" pitchFamily="49" charset="0"/>
+                <a:cs typeface="Courier New" panose="02070309020205020404" pitchFamily="49" charset="0"/>
+              </a:rPr>
+              <a:t>int</a:t>
+            </a:r>
+            <a:r>
+              <a:rPr lang="en-US" sz="900" dirty="0">
+                <a:solidFill>
+                  <a:srgbClr val="92D050"/>
+                </a:solidFill>
+                <a:latin typeface="Courier New" panose="02070309020205020404" pitchFamily="49" charset="0"/>
+                <a:cs typeface="Courier New" panose="02070309020205020404" pitchFamily="49" charset="0"/>
+              </a:rPr>
+              <a:t>[] </a:t>
+            </a:r>
+            <a:r>
+              <a:rPr lang="en-US" sz="900" dirty="0" err="1">
+                <a:solidFill>
+                  <a:srgbClr val="92D050"/>
+                </a:solidFill>
+                <a:latin typeface="Courier New" panose="02070309020205020404" pitchFamily="49" charset="0"/>
+                <a:cs typeface="Courier New" panose="02070309020205020404" pitchFamily="49" charset="0"/>
+              </a:rPr>
+              <a:t>sumArrays</a:t>
+            </a:r>
+            <a:r>
+              <a:rPr lang="en-US" sz="900" dirty="0">
+                <a:solidFill>
+                  <a:srgbClr val="92D050"/>
+                </a:solidFill>
+                <a:latin typeface="Courier New" panose="02070309020205020404" pitchFamily="49" charset="0"/>
+                <a:cs typeface="Courier New" panose="02070309020205020404" pitchFamily="49" charset="0"/>
+              </a:rPr>
+              <a:t>(List&lt;</a:t>
+            </a:r>
+            <a:r>
+              <a:rPr lang="en-US" sz="900" dirty="0" err="1">
+                <a:solidFill>
+                  <a:srgbClr val="92D050"/>
+                </a:solidFill>
+                <a:latin typeface="Courier New" panose="02070309020205020404" pitchFamily="49" charset="0"/>
+                <a:cs typeface="Courier New" panose="02070309020205020404" pitchFamily="49" charset="0"/>
+              </a:rPr>
+              <a:t>int</a:t>
+            </a:r>
+            <a:r>
+              <a:rPr lang="en-US" sz="900" dirty="0">
+                <a:solidFill>
+                  <a:srgbClr val="92D050"/>
+                </a:solidFill>
+                <a:latin typeface="Courier New" panose="02070309020205020404" pitchFamily="49" charset="0"/>
+                <a:cs typeface="Courier New" panose="02070309020205020404" pitchFamily="49" charset="0"/>
+              </a:rPr>
+              <a:t>[]&gt; arrays){</a:t>
+            </a:r>
+          </a:p>
+          <a:p>
+            <a:endParaRPr lang="en-US" sz="900" dirty="0">
+              <a:solidFill>
+                <a:srgbClr val="92D050"/>
+              </a:solidFill>
+              <a:latin typeface="Courier New" panose="02070309020205020404" pitchFamily="49" charset="0"/>
+              <a:cs typeface="Courier New" panose="02070309020205020404" pitchFamily="49" charset="0"/>
+            </a:endParaRPr>
+          </a:p>
+          <a:p>
+            <a:r>
+              <a:rPr lang="en-US" sz="900" b="1" i="1" dirty="0">
+                <a:solidFill>
+                  <a:schemeClr val="accent1"/>
+                </a:solidFill>
+                <a:latin typeface="Courier New" panose="02070309020205020404" pitchFamily="49" charset="0"/>
+                <a:cs typeface="Courier New" panose="02070309020205020404" pitchFamily="49" charset="0"/>
+              </a:rPr>
+              <a:t>     List&lt;Kernel&gt; jobs = new </a:t>
+            </a:r>
+            <a:r>
+              <a:rPr lang="en-US" sz="900" b="1" i="1" dirty="0" err="1">
+                <a:solidFill>
+                  <a:schemeClr val="accent1"/>
+                </a:solidFill>
+                <a:latin typeface="Courier New" panose="02070309020205020404" pitchFamily="49" charset="0"/>
+                <a:cs typeface="Courier New" panose="02070309020205020404" pitchFamily="49" charset="0"/>
+              </a:rPr>
+              <a:t>ArrayList</a:t>
+            </a:r>
+            <a:r>
+              <a:rPr lang="en-US" sz="900" b="1" i="1" dirty="0">
+                <a:solidFill>
+                  <a:schemeClr val="accent1"/>
+                </a:solidFill>
+                <a:latin typeface="Courier New" panose="02070309020205020404" pitchFamily="49" charset="0"/>
+                <a:cs typeface="Courier New" panose="02070309020205020404" pitchFamily="49" charset="0"/>
+              </a:rPr>
+              <a:t>&lt;Kernel&gt;();</a:t>
+            </a:r>
+          </a:p>
+          <a:p>
+            <a:r>
+              <a:rPr lang="en-US" sz="900" dirty="0">
+                <a:solidFill>
+                  <a:srgbClr val="92D050"/>
+                </a:solidFill>
+                <a:latin typeface="Courier New" panose="02070309020205020404" pitchFamily="49" charset="0"/>
+                <a:cs typeface="Courier New" panose="02070309020205020404" pitchFamily="49" charset="0"/>
+              </a:rPr>
+              <a:t>     </a:t>
+            </a:r>
+            <a:r>
+              <a:rPr lang="en-US" sz="900" dirty="0" err="1">
+                <a:solidFill>
+                  <a:srgbClr val="92D050"/>
+                </a:solidFill>
+                <a:latin typeface="Courier New" panose="02070309020205020404" pitchFamily="49" charset="0"/>
+                <a:cs typeface="Courier New" panose="02070309020205020404" pitchFamily="49" charset="0"/>
+              </a:rPr>
+              <a:t>int</a:t>
+            </a:r>
+            <a:r>
+              <a:rPr lang="en-US" sz="900" dirty="0">
+                <a:solidFill>
+                  <a:srgbClr val="92D050"/>
+                </a:solidFill>
+                <a:latin typeface="Courier New" panose="02070309020205020404" pitchFamily="49" charset="0"/>
+                <a:cs typeface="Courier New" panose="02070309020205020404" pitchFamily="49" charset="0"/>
+              </a:rPr>
+              <a:t>[] ret = new </a:t>
+            </a:r>
+            <a:r>
+              <a:rPr lang="en-US" sz="900" dirty="0" err="1">
+                <a:solidFill>
+                  <a:srgbClr val="92D050"/>
+                </a:solidFill>
+                <a:latin typeface="Courier New" panose="02070309020205020404" pitchFamily="49" charset="0"/>
+                <a:cs typeface="Courier New" panose="02070309020205020404" pitchFamily="49" charset="0"/>
+              </a:rPr>
+              <a:t>int</a:t>
+            </a:r>
+            <a:r>
+              <a:rPr lang="en-US" sz="900" dirty="0">
+                <a:solidFill>
+                  <a:srgbClr val="92D050"/>
+                </a:solidFill>
+                <a:latin typeface="Courier New" panose="02070309020205020404" pitchFamily="49" charset="0"/>
+                <a:cs typeface="Courier New" panose="02070309020205020404" pitchFamily="49" charset="0"/>
+              </a:rPr>
+              <a:t>[</a:t>
+            </a:r>
+            <a:r>
+              <a:rPr lang="en-US" sz="900" dirty="0" err="1">
+                <a:solidFill>
+                  <a:srgbClr val="92D050"/>
+                </a:solidFill>
+                <a:latin typeface="Courier New" panose="02070309020205020404" pitchFamily="49" charset="0"/>
+                <a:cs typeface="Courier New" panose="02070309020205020404" pitchFamily="49" charset="0"/>
+              </a:rPr>
+              <a:t>arrays.size</a:t>
+            </a:r>
+            <a:r>
+              <a:rPr lang="en-US" sz="900" dirty="0">
+                <a:solidFill>
+                  <a:srgbClr val="92D050"/>
+                </a:solidFill>
+                <a:latin typeface="Courier New" panose="02070309020205020404" pitchFamily="49" charset="0"/>
+                <a:cs typeface="Courier New" panose="02070309020205020404" pitchFamily="49" charset="0"/>
+              </a:rPr>
+              <a:t>()];</a:t>
+            </a:r>
+          </a:p>
+          <a:p>
+            <a:r>
+              <a:rPr lang="en-US" sz="900" b="1" i="1" dirty="0">
+                <a:solidFill>
+                  <a:schemeClr val="accent1"/>
+                </a:solidFill>
+                <a:latin typeface="Courier New" panose="02070309020205020404" pitchFamily="49" charset="0"/>
+                <a:cs typeface="Courier New" panose="02070309020205020404" pitchFamily="49" charset="0"/>
+              </a:rPr>
+              <a:t>     for(</a:t>
+            </a:r>
+            <a:r>
+              <a:rPr lang="en-US" sz="900" b="1" i="1" dirty="0" err="1">
+                <a:solidFill>
+                  <a:schemeClr val="accent1"/>
+                </a:solidFill>
+                <a:latin typeface="Courier New" panose="02070309020205020404" pitchFamily="49" charset="0"/>
+                <a:cs typeface="Courier New" panose="02070309020205020404" pitchFamily="49" charset="0"/>
+              </a:rPr>
+              <a:t>int</a:t>
+            </a:r>
+            <a:r>
+              <a:rPr lang="en-US" sz="900" b="1" i="1" dirty="0">
+                <a:solidFill>
+                  <a:schemeClr val="accent1"/>
+                </a:solidFill>
+                <a:latin typeface="Courier New" panose="02070309020205020404" pitchFamily="49" charset="0"/>
+                <a:cs typeface="Courier New" panose="02070309020205020404" pitchFamily="49" charset="0"/>
+              </a:rPr>
+              <a:t> </a:t>
+            </a:r>
+            <a:r>
+              <a:rPr lang="en-US" sz="900" b="1" i="1" dirty="0" err="1">
+                <a:solidFill>
+                  <a:schemeClr val="accent1"/>
+                </a:solidFill>
+                <a:latin typeface="Courier New" panose="02070309020205020404" pitchFamily="49" charset="0"/>
+                <a:cs typeface="Courier New" panose="02070309020205020404" pitchFamily="49" charset="0"/>
+              </a:rPr>
+              <a:t>i</a:t>
+            </a:r>
+            <a:r>
+              <a:rPr lang="en-US" sz="900" b="1" i="1" dirty="0">
+                <a:solidFill>
+                  <a:schemeClr val="accent1"/>
+                </a:solidFill>
+                <a:latin typeface="Courier New" panose="02070309020205020404" pitchFamily="49" charset="0"/>
+                <a:cs typeface="Courier New" panose="02070309020205020404" pitchFamily="49" charset="0"/>
+              </a:rPr>
+              <a:t> = 0; </a:t>
+            </a:r>
+            <a:r>
+              <a:rPr lang="en-US" sz="900" b="1" i="1" dirty="0" err="1">
+                <a:solidFill>
+                  <a:schemeClr val="accent1"/>
+                </a:solidFill>
+                <a:latin typeface="Courier New" panose="02070309020205020404" pitchFamily="49" charset="0"/>
+                <a:cs typeface="Courier New" panose="02070309020205020404" pitchFamily="49" charset="0"/>
+              </a:rPr>
+              <a:t>i</a:t>
+            </a:r>
+            <a:r>
+              <a:rPr lang="en-US" sz="900" b="1" i="1" dirty="0">
+                <a:solidFill>
+                  <a:schemeClr val="accent1"/>
+                </a:solidFill>
+                <a:latin typeface="Courier New" panose="02070309020205020404" pitchFamily="49" charset="0"/>
+                <a:cs typeface="Courier New" panose="02070309020205020404" pitchFamily="49" charset="0"/>
+              </a:rPr>
+              <a:t> &lt; </a:t>
+            </a:r>
+            <a:r>
+              <a:rPr lang="en-US" sz="900" b="1" i="1" dirty="0" err="1">
+                <a:solidFill>
+                  <a:schemeClr val="accent1"/>
+                </a:solidFill>
+                <a:latin typeface="Courier New" panose="02070309020205020404" pitchFamily="49" charset="0"/>
+                <a:cs typeface="Courier New" panose="02070309020205020404" pitchFamily="49" charset="0"/>
+              </a:rPr>
+              <a:t>arrays.size</a:t>
+            </a:r>
+            <a:r>
+              <a:rPr lang="en-US" sz="900" b="1" i="1" dirty="0">
+                <a:solidFill>
+                  <a:schemeClr val="accent1"/>
+                </a:solidFill>
+                <a:latin typeface="Courier New" panose="02070309020205020404" pitchFamily="49" charset="0"/>
+                <a:cs typeface="Courier New" panose="02070309020205020404" pitchFamily="49" charset="0"/>
+              </a:rPr>
+              <a:t>(); ++</a:t>
+            </a:r>
+            <a:r>
+              <a:rPr lang="en-US" sz="900" b="1" i="1" dirty="0" err="1">
+                <a:solidFill>
+                  <a:schemeClr val="accent1"/>
+                </a:solidFill>
+                <a:latin typeface="Courier New" panose="02070309020205020404" pitchFamily="49" charset="0"/>
+                <a:cs typeface="Courier New" panose="02070309020205020404" pitchFamily="49" charset="0"/>
+              </a:rPr>
+              <a:t>i</a:t>
+            </a:r>
+            <a:r>
+              <a:rPr lang="en-US" sz="900" b="1" i="1" dirty="0">
+                <a:solidFill>
+                  <a:schemeClr val="accent1"/>
+                </a:solidFill>
+                <a:latin typeface="Courier New" panose="02070309020205020404" pitchFamily="49" charset="0"/>
+                <a:cs typeface="Courier New" panose="02070309020205020404" pitchFamily="49" charset="0"/>
+              </a:rPr>
+              <a:t>){</a:t>
+            </a:r>
+          </a:p>
+          <a:p>
+            <a:r>
+              <a:rPr lang="en-US" sz="900" b="1" i="1" dirty="0">
+                <a:solidFill>
+                  <a:schemeClr val="accent1"/>
+                </a:solidFill>
+                <a:latin typeface="Courier New" panose="02070309020205020404" pitchFamily="49" charset="0"/>
+                <a:cs typeface="Courier New" panose="02070309020205020404" pitchFamily="49" charset="0"/>
+              </a:rPr>
+              <a:t>        </a:t>
+            </a:r>
+            <a:r>
+              <a:rPr lang="en-US" sz="900" b="1" i="1" dirty="0" err="1">
+                <a:solidFill>
+                  <a:schemeClr val="accent1"/>
+                </a:solidFill>
+                <a:latin typeface="Courier New" panose="02070309020205020404" pitchFamily="49" charset="0"/>
+                <a:cs typeface="Courier New" panose="02070309020205020404" pitchFamily="49" charset="0"/>
+              </a:rPr>
+              <a:t>jobs.add</a:t>
+            </a:r>
+            <a:r>
+              <a:rPr lang="en-US" sz="900" b="1" i="1" dirty="0">
+                <a:solidFill>
+                  <a:schemeClr val="accent1"/>
+                </a:solidFill>
+                <a:latin typeface="Courier New" panose="02070309020205020404" pitchFamily="49" charset="0"/>
+                <a:cs typeface="Courier New" panose="02070309020205020404" pitchFamily="49" charset="0"/>
+              </a:rPr>
+              <a:t>(new </a:t>
+            </a:r>
+            <a:r>
+              <a:rPr lang="en-US" sz="900" b="1" i="1" dirty="0" err="1">
+                <a:solidFill>
+                  <a:schemeClr val="accent1"/>
+                </a:solidFill>
+                <a:latin typeface="Courier New" panose="02070309020205020404" pitchFamily="49" charset="0"/>
+                <a:cs typeface="Courier New" panose="02070309020205020404" pitchFamily="49" charset="0"/>
+              </a:rPr>
+              <a:t>ArraySum</a:t>
+            </a:r>
+            <a:r>
+              <a:rPr lang="en-US" sz="900" b="1" i="1" dirty="0">
+                <a:solidFill>
+                  <a:schemeClr val="accent1"/>
+                </a:solidFill>
+                <a:latin typeface="Courier New" panose="02070309020205020404" pitchFamily="49" charset="0"/>
+                <a:cs typeface="Courier New" panose="02070309020205020404" pitchFamily="49" charset="0"/>
+              </a:rPr>
+              <a:t>(</a:t>
+            </a:r>
+            <a:r>
+              <a:rPr lang="en-US" sz="900" b="1" i="1" dirty="0" err="1">
+                <a:solidFill>
+                  <a:schemeClr val="accent1"/>
+                </a:solidFill>
+                <a:latin typeface="Courier New" panose="02070309020205020404" pitchFamily="49" charset="0"/>
+                <a:cs typeface="Courier New" panose="02070309020205020404" pitchFamily="49" charset="0"/>
+              </a:rPr>
+              <a:t>arrays.get</a:t>
+            </a:r>
+            <a:r>
+              <a:rPr lang="en-US" sz="900" b="1" i="1" dirty="0">
+                <a:solidFill>
+                  <a:schemeClr val="accent1"/>
+                </a:solidFill>
+                <a:latin typeface="Courier New" panose="02070309020205020404" pitchFamily="49" charset="0"/>
+                <a:cs typeface="Courier New" panose="02070309020205020404" pitchFamily="49" charset="0"/>
+              </a:rPr>
+              <a:t>(</a:t>
+            </a:r>
+            <a:r>
+              <a:rPr lang="en-US" sz="900" b="1" i="1" dirty="0" err="1">
+                <a:solidFill>
+                  <a:schemeClr val="accent1"/>
+                </a:solidFill>
+                <a:latin typeface="Courier New" panose="02070309020205020404" pitchFamily="49" charset="0"/>
+                <a:cs typeface="Courier New" panose="02070309020205020404" pitchFamily="49" charset="0"/>
+              </a:rPr>
+              <a:t>i</a:t>
+            </a:r>
+            <a:r>
+              <a:rPr lang="en-US" sz="900" b="1" i="1" dirty="0">
+                <a:solidFill>
+                  <a:schemeClr val="accent1"/>
+                </a:solidFill>
+                <a:latin typeface="Courier New" panose="02070309020205020404" pitchFamily="49" charset="0"/>
+                <a:cs typeface="Courier New" panose="02070309020205020404" pitchFamily="49" charset="0"/>
+              </a:rPr>
+              <a:t>), ret, </a:t>
+            </a:r>
+            <a:r>
+              <a:rPr lang="en-US" sz="900" b="1" i="1" dirty="0" err="1">
+                <a:solidFill>
+                  <a:schemeClr val="accent1"/>
+                </a:solidFill>
+                <a:latin typeface="Courier New" panose="02070309020205020404" pitchFamily="49" charset="0"/>
+                <a:cs typeface="Courier New" panose="02070309020205020404" pitchFamily="49" charset="0"/>
+              </a:rPr>
+              <a:t>i</a:t>
+            </a:r>
+            <a:r>
+              <a:rPr lang="en-US" sz="900" b="1" i="1" dirty="0">
+                <a:solidFill>
+                  <a:schemeClr val="accent1"/>
+                </a:solidFill>
+                <a:latin typeface="Courier New" panose="02070309020205020404" pitchFamily="49" charset="0"/>
+                <a:cs typeface="Courier New" panose="02070309020205020404" pitchFamily="49" charset="0"/>
+              </a:rPr>
+              <a:t>));</a:t>
+            </a:r>
+          </a:p>
+          <a:p>
+            <a:r>
+              <a:rPr lang="en-US" sz="900" b="1" i="1" dirty="0">
+                <a:solidFill>
+                  <a:schemeClr val="accent1"/>
+                </a:solidFill>
+                <a:latin typeface="Courier New" panose="02070309020205020404" pitchFamily="49" charset="0"/>
+                <a:cs typeface="Courier New" panose="02070309020205020404" pitchFamily="49" charset="0"/>
+              </a:rPr>
+              <a:t>     }</a:t>
+            </a:r>
+          </a:p>
+          <a:p>
+            <a:endParaRPr lang="en-US" sz="900" dirty="0">
+              <a:solidFill>
+                <a:srgbClr val="92D050"/>
+              </a:solidFill>
+              <a:latin typeface="Courier New" panose="02070309020205020404" pitchFamily="49" charset="0"/>
+              <a:cs typeface="Courier New" panose="02070309020205020404" pitchFamily="49" charset="0"/>
+            </a:endParaRPr>
+          </a:p>
+          <a:p>
+            <a:r>
+              <a:rPr lang="en-US" sz="900" b="1" i="1" dirty="0">
+                <a:solidFill>
+                  <a:srgbClr val="92D050"/>
+                </a:solidFill>
+                <a:latin typeface="Courier New" panose="02070309020205020404" pitchFamily="49" charset="0"/>
+                <a:cs typeface="Courier New" panose="02070309020205020404" pitchFamily="49" charset="0"/>
+              </a:rPr>
+              <a:t>     </a:t>
+            </a:r>
+            <a:r>
+              <a:rPr lang="en-US" sz="900" b="1" i="1" dirty="0" err="1">
+                <a:solidFill>
+                  <a:schemeClr val="accent1"/>
+                </a:solidFill>
+                <a:latin typeface="Courier New" panose="02070309020205020404" pitchFamily="49" charset="0"/>
+                <a:cs typeface="Courier New" panose="02070309020205020404" pitchFamily="49" charset="0"/>
+              </a:rPr>
+              <a:t>Rootbeer</a:t>
+            </a:r>
+            <a:r>
+              <a:rPr lang="en-US" sz="900" b="1" i="1" dirty="0">
+                <a:solidFill>
+                  <a:schemeClr val="accent1"/>
+                </a:solidFill>
+                <a:latin typeface="Courier New" panose="02070309020205020404" pitchFamily="49" charset="0"/>
+                <a:cs typeface="Courier New" panose="02070309020205020404" pitchFamily="49" charset="0"/>
+              </a:rPr>
+              <a:t> </a:t>
+            </a:r>
+            <a:r>
+              <a:rPr lang="en-US" sz="900" b="1" i="1" dirty="0" err="1">
+                <a:solidFill>
+                  <a:schemeClr val="accent1"/>
+                </a:solidFill>
+                <a:latin typeface="Courier New" panose="02070309020205020404" pitchFamily="49" charset="0"/>
+                <a:cs typeface="Courier New" panose="02070309020205020404" pitchFamily="49" charset="0"/>
+              </a:rPr>
+              <a:t>rootbeer</a:t>
+            </a:r>
+            <a:r>
+              <a:rPr lang="en-US" sz="900" b="1" i="1" dirty="0">
+                <a:solidFill>
+                  <a:schemeClr val="accent1"/>
+                </a:solidFill>
+                <a:latin typeface="Courier New" panose="02070309020205020404" pitchFamily="49" charset="0"/>
+                <a:cs typeface="Courier New" panose="02070309020205020404" pitchFamily="49" charset="0"/>
+              </a:rPr>
+              <a:t> = new </a:t>
+            </a:r>
+            <a:r>
+              <a:rPr lang="en-US" sz="900" b="1" i="1" dirty="0" err="1">
+                <a:solidFill>
+                  <a:schemeClr val="accent1"/>
+                </a:solidFill>
+                <a:latin typeface="Courier New" panose="02070309020205020404" pitchFamily="49" charset="0"/>
+                <a:cs typeface="Courier New" panose="02070309020205020404" pitchFamily="49" charset="0"/>
+              </a:rPr>
+              <a:t>Rootbeer</a:t>
+            </a:r>
+            <a:r>
+              <a:rPr lang="en-US" sz="900" b="1" i="1" dirty="0">
+                <a:solidFill>
+                  <a:schemeClr val="accent1"/>
+                </a:solidFill>
+                <a:latin typeface="Courier New" panose="02070309020205020404" pitchFamily="49" charset="0"/>
+                <a:cs typeface="Courier New" panose="02070309020205020404" pitchFamily="49" charset="0"/>
+              </a:rPr>
+              <a:t>();</a:t>
+            </a:r>
+          </a:p>
+          <a:p>
+            <a:r>
+              <a:rPr lang="en-US" sz="900" b="1" i="1" dirty="0">
+                <a:solidFill>
+                  <a:srgbClr val="92D050"/>
+                </a:solidFill>
+                <a:latin typeface="Courier New" panose="02070309020205020404" pitchFamily="49" charset="0"/>
+                <a:cs typeface="Courier New" panose="02070309020205020404" pitchFamily="49" charset="0"/>
+              </a:rPr>
+              <a:t>     </a:t>
+            </a:r>
+            <a:r>
+              <a:rPr lang="en-US" sz="900" b="1" i="1" dirty="0">
+                <a:solidFill>
+                  <a:schemeClr val="accent1"/>
+                </a:solidFill>
+                <a:latin typeface="Courier New" panose="02070309020205020404" pitchFamily="49" charset="0"/>
+                <a:cs typeface="Courier New" panose="02070309020205020404" pitchFamily="49" charset="0"/>
+              </a:rPr>
+              <a:t>Context </a:t>
+            </a:r>
+            <a:r>
+              <a:rPr lang="en-US" sz="900" b="1" i="1" dirty="0" err="1">
+                <a:solidFill>
+                  <a:schemeClr val="accent1"/>
+                </a:solidFill>
+                <a:latin typeface="Courier New" panose="02070309020205020404" pitchFamily="49" charset="0"/>
+                <a:cs typeface="Courier New" panose="02070309020205020404" pitchFamily="49" charset="0"/>
+              </a:rPr>
+              <a:t>context</a:t>
+            </a:r>
+            <a:r>
+              <a:rPr lang="en-US" sz="900" b="1" i="1" dirty="0">
+                <a:solidFill>
+                  <a:schemeClr val="accent1"/>
+                </a:solidFill>
+                <a:latin typeface="Courier New" panose="02070309020205020404" pitchFamily="49" charset="0"/>
+                <a:cs typeface="Courier New" panose="02070309020205020404" pitchFamily="49" charset="0"/>
+              </a:rPr>
+              <a:t> = </a:t>
+            </a:r>
+            <a:r>
+              <a:rPr lang="en-US" sz="900" b="1" i="1" dirty="0" err="1">
+                <a:solidFill>
+                  <a:schemeClr val="accent1"/>
+                </a:solidFill>
+                <a:latin typeface="Courier New" panose="02070309020205020404" pitchFamily="49" charset="0"/>
+                <a:cs typeface="Courier New" panose="02070309020205020404" pitchFamily="49" charset="0"/>
+              </a:rPr>
+              <a:t>rootbeer.createDefaultContext</a:t>
+            </a:r>
+            <a:r>
+              <a:rPr lang="en-US" sz="900" b="1" i="1" dirty="0">
+                <a:solidFill>
+                  <a:schemeClr val="accent1"/>
+                </a:solidFill>
+                <a:latin typeface="Courier New" panose="02070309020205020404" pitchFamily="49" charset="0"/>
+                <a:cs typeface="Courier New" panose="02070309020205020404" pitchFamily="49" charset="0"/>
+              </a:rPr>
+              <a:t>();</a:t>
+            </a:r>
+          </a:p>
+          <a:p>
+            <a:r>
+              <a:rPr lang="en-US" sz="900" b="1" i="1" dirty="0">
+                <a:solidFill>
+                  <a:schemeClr val="accent1"/>
+                </a:solidFill>
+                <a:latin typeface="Courier New" panose="02070309020205020404" pitchFamily="49" charset="0"/>
+                <a:cs typeface="Courier New" panose="02070309020205020404" pitchFamily="49" charset="0"/>
+              </a:rPr>
+              <a:t>     </a:t>
+            </a:r>
+            <a:r>
+              <a:rPr lang="en-US" sz="900" b="1" i="1" dirty="0" err="1">
+                <a:solidFill>
+                  <a:schemeClr val="accent1"/>
+                </a:solidFill>
+                <a:latin typeface="Courier New" panose="02070309020205020404" pitchFamily="49" charset="0"/>
+                <a:cs typeface="Courier New" panose="02070309020205020404" pitchFamily="49" charset="0"/>
+              </a:rPr>
+              <a:t>context.init</a:t>
+            </a:r>
+            <a:r>
+              <a:rPr lang="en-US" sz="900" b="1" i="1" dirty="0">
+                <a:solidFill>
+                  <a:schemeClr val="accent1"/>
+                </a:solidFill>
+                <a:latin typeface="Courier New" panose="02070309020205020404" pitchFamily="49" charset="0"/>
+                <a:cs typeface="Courier New" panose="02070309020205020404" pitchFamily="49" charset="0"/>
+              </a:rPr>
+              <a:t>(1024*1024*4);</a:t>
+            </a:r>
+          </a:p>
+          <a:p>
+            <a:r>
+              <a:rPr lang="en-US" sz="900" b="1" i="1" dirty="0">
+                <a:solidFill>
+                  <a:schemeClr val="accent1"/>
+                </a:solidFill>
+                <a:latin typeface="Courier New" panose="02070309020205020404" pitchFamily="49" charset="0"/>
+                <a:cs typeface="Courier New" panose="02070309020205020404" pitchFamily="49" charset="0"/>
+              </a:rPr>
+              <a:t>     </a:t>
+            </a:r>
+            <a:r>
+              <a:rPr lang="en-US" sz="900" b="1" i="1" dirty="0" err="1">
+                <a:solidFill>
+                  <a:schemeClr val="accent1"/>
+                </a:solidFill>
+                <a:latin typeface="Courier New" panose="02070309020205020404" pitchFamily="49" charset="0"/>
+                <a:cs typeface="Courier New" panose="02070309020205020404" pitchFamily="49" charset="0"/>
+              </a:rPr>
+              <a:t>rootbeer.run</a:t>
+            </a:r>
+            <a:r>
+              <a:rPr lang="en-US" sz="900" b="1" i="1" dirty="0">
+                <a:solidFill>
+                  <a:schemeClr val="accent1"/>
+                </a:solidFill>
+                <a:latin typeface="Courier New" panose="02070309020205020404" pitchFamily="49" charset="0"/>
+                <a:cs typeface="Courier New" panose="02070309020205020404" pitchFamily="49" charset="0"/>
+              </a:rPr>
+              <a:t>(jobs, context);</a:t>
+            </a:r>
+          </a:p>
+          <a:p>
+            <a:r>
+              <a:rPr lang="en-US" sz="900" dirty="0">
+                <a:solidFill>
+                  <a:srgbClr val="92D050"/>
+                </a:solidFill>
+                <a:latin typeface="Courier New" panose="02070309020205020404" pitchFamily="49" charset="0"/>
+                <a:cs typeface="Courier New" panose="02070309020205020404" pitchFamily="49" charset="0"/>
+              </a:rPr>
+              <a:t>     return ret;</a:t>
+            </a:r>
+          </a:p>
+          <a:p>
+            <a:r>
+              <a:rPr lang="en-US" sz="900" dirty="0">
+                <a:solidFill>
+                  <a:srgbClr val="92D050"/>
+                </a:solidFill>
+                <a:latin typeface="Courier New" panose="02070309020205020404" pitchFamily="49" charset="0"/>
+                <a:cs typeface="Courier New" panose="02070309020205020404" pitchFamily="49" charset="0"/>
+              </a:rPr>
+              <a:t>  }</a:t>
+            </a:r>
+          </a:p>
+          <a:p>
+            <a:r>
+              <a:rPr lang="en-US" sz="900" dirty="0">
+                <a:solidFill>
+                  <a:srgbClr val="92D050"/>
+                </a:solidFill>
+                <a:latin typeface="Courier New" panose="02070309020205020404" pitchFamily="49" charset="0"/>
+                <a:cs typeface="Courier New" panose="02070309020205020404" pitchFamily="49" charset="0"/>
+              </a:rPr>
+              <a:t>  </a:t>
+            </a:r>
+          </a:p>
+          <a:p>
+            <a:r>
+              <a:rPr lang="en-US" sz="900" dirty="0">
+                <a:solidFill>
+                  <a:srgbClr val="92D050"/>
+                </a:solidFill>
+                <a:latin typeface="Courier New" panose="02070309020205020404" pitchFamily="49" charset="0"/>
+                <a:cs typeface="Courier New" panose="02070309020205020404" pitchFamily="49" charset="0"/>
+              </a:rPr>
+              <a:t>  public static void main(String[] </a:t>
+            </a:r>
+            <a:r>
+              <a:rPr lang="en-US" sz="900" dirty="0" err="1">
+                <a:solidFill>
+                  <a:srgbClr val="92D050"/>
+                </a:solidFill>
+                <a:latin typeface="Courier New" panose="02070309020205020404" pitchFamily="49" charset="0"/>
+                <a:cs typeface="Courier New" panose="02070309020205020404" pitchFamily="49" charset="0"/>
+              </a:rPr>
+              <a:t>args</a:t>
+            </a:r>
+            <a:r>
+              <a:rPr lang="en-US" sz="900" dirty="0">
+                <a:solidFill>
+                  <a:srgbClr val="92D050"/>
+                </a:solidFill>
+                <a:latin typeface="Courier New" panose="02070309020205020404" pitchFamily="49" charset="0"/>
+                <a:cs typeface="Courier New" panose="02070309020205020404" pitchFamily="49" charset="0"/>
+              </a:rPr>
+              <a:t>){</a:t>
+            </a:r>
+          </a:p>
+          <a:p>
+            <a:r>
+              <a:rPr lang="en-US" sz="900" dirty="0">
+                <a:solidFill>
+                  <a:srgbClr val="92D050"/>
+                </a:solidFill>
+                <a:latin typeface="Courier New" panose="02070309020205020404" pitchFamily="49" charset="0"/>
+                <a:cs typeface="Courier New" panose="02070309020205020404" pitchFamily="49" charset="0"/>
+              </a:rPr>
+              <a:t>    </a:t>
+            </a:r>
+            <a:r>
+              <a:rPr lang="en-US" sz="900" dirty="0" err="1">
+                <a:solidFill>
+                  <a:srgbClr val="92D050"/>
+                </a:solidFill>
+                <a:latin typeface="Courier New" panose="02070309020205020404" pitchFamily="49" charset="0"/>
+                <a:cs typeface="Courier New" panose="02070309020205020404" pitchFamily="49" charset="0"/>
+              </a:rPr>
+              <a:t>ArraySumApp</a:t>
+            </a:r>
+            <a:r>
+              <a:rPr lang="en-US" sz="900" dirty="0">
+                <a:solidFill>
+                  <a:srgbClr val="92D050"/>
+                </a:solidFill>
+                <a:latin typeface="Courier New" panose="02070309020205020404" pitchFamily="49" charset="0"/>
+                <a:cs typeface="Courier New" panose="02070309020205020404" pitchFamily="49" charset="0"/>
+              </a:rPr>
+              <a:t> app = new </a:t>
+            </a:r>
+            <a:r>
+              <a:rPr lang="en-US" sz="900" dirty="0" err="1">
+                <a:solidFill>
+                  <a:srgbClr val="92D050"/>
+                </a:solidFill>
+                <a:latin typeface="Courier New" panose="02070309020205020404" pitchFamily="49" charset="0"/>
+                <a:cs typeface="Courier New" panose="02070309020205020404" pitchFamily="49" charset="0"/>
+              </a:rPr>
+              <a:t>ArraySumApp</a:t>
+            </a:r>
+            <a:r>
+              <a:rPr lang="en-US" sz="900" dirty="0">
+                <a:solidFill>
+                  <a:srgbClr val="92D050"/>
+                </a:solidFill>
+                <a:latin typeface="Courier New" panose="02070309020205020404" pitchFamily="49" charset="0"/>
+                <a:cs typeface="Courier New" panose="02070309020205020404" pitchFamily="49" charset="0"/>
+              </a:rPr>
+              <a:t>();</a:t>
+            </a:r>
+          </a:p>
+          <a:p>
+            <a:r>
+              <a:rPr lang="en-US" sz="900" dirty="0">
+                <a:solidFill>
+                  <a:srgbClr val="92D050"/>
+                </a:solidFill>
+                <a:latin typeface="Courier New" panose="02070309020205020404" pitchFamily="49" charset="0"/>
+                <a:cs typeface="Courier New" panose="02070309020205020404" pitchFamily="49" charset="0"/>
+              </a:rPr>
+              <a:t>    List&lt;</a:t>
+            </a:r>
+            <a:r>
+              <a:rPr lang="en-US" sz="900" dirty="0" err="1">
+                <a:solidFill>
+                  <a:srgbClr val="92D050"/>
+                </a:solidFill>
+                <a:latin typeface="Courier New" panose="02070309020205020404" pitchFamily="49" charset="0"/>
+                <a:cs typeface="Courier New" panose="02070309020205020404" pitchFamily="49" charset="0"/>
+              </a:rPr>
+              <a:t>int</a:t>
+            </a:r>
+            <a:r>
+              <a:rPr lang="en-US" sz="900" dirty="0">
+                <a:solidFill>
+                  <a:srgbClr val="92D050"/>
+                </a:solidFill>
+                <a:latin typeface="Courier New" panose="02070309020205020404" pitchFamily="49" charset="0"/>
+                <a:cs typeface="Courier New" panose="02070309020205020404" pitchFamily="49" charset="0"/>
+              </a:rPr>
+              <a:t>[]&gt; arrays = new </a:t>
+            </a:r>
+            <a:r>
+              <a:rPr lang="en-US" sz="900" dirty="0" err="1">
+                <a:solidFill>
+                  <a:srgbClr val="92D050"/>
+                </a:solidFill>
+                <a:latin typeface="Courier New" panose="02070309020205020404" pitchFamily="49" charset="0"/>
+                <a:cs typeface="Courier New" panose="02070309020205020404" pitchFamily="49" charset="0"/>
+              </a:rPr>
+              <a:t>ArrayList</a:t>
+            </a:r>
+            <a:r>
+              <a:rPr lang="en-US" sz="900" dirty="0">
+                <a:solidFill>
+                  <a:srgbClr val="92D050"/>
+                </a:solidFill>
+                <a:latin typeface="Courier New" panose="02070309020205020404" pitchFamily="49" charset="0"/>
+                <a:cs typeface="Courier New" panose="02070309020205020404" pitchFamily="49" charset="0"/>
+              </a:rPr>
+              <a:t>&lt;</a:t>
+            </a:r>
+            <a:r>
+              <a:rPr lang="en-US" sz="900" dirty="0" err="1">
+                <a:solidFill>
+                  <a:srgbClr val="92D050"/>
+                </a:solidFill>
+                <a:latin typeface="Courier New" panose="02070309020205020404" pitchFamily="49" charset="0"/>
+                <a:cs typeface="Courier New" panose="02070309020205020404" pitchFamily="49" charset="0"/>
+              </a:rPr>
+              <a:t>int</a:t>
+            </a:r>
+            <a:r>
+              <a:rPr lang="en-US" sz="900" dirty="0">
+                <a:solidFill>
+                  <a:srgbClr val="92D050"/>
+                </a:solidFill>
+                <a:latin typeface="Courier New" panose="02070309020205020404" pitchFamily="49" charset="0"/>
+                <a:cs typeface="Courier New" panose="02070309020205020404" pitchFamily="49" charset="0"/>
+              </a:rPr>
+              <a:t>[]&gt;();</a:t>
+            </a:r>
+          </a:p>
+          <a:p>
+            <a:r>
+              <a:rPr lang="en-US" sz="900" dirty="0">
+                <a:solidFill>
+                  <a:srgbClr val="92D050"/>
+                </a:solidFill>
+                <a:latin typeface="Courier New" panose="02070309020205020404" pitchFamily="49" charset="0"/>
+                <a:cs typeface="Courier New" panose="02070309020205020404" pitchFamily="49" charset="0"/>
+              </a:rPr>
+              <a:t>    </a:t>
+            </a:r>
+          </a:p>
+          <a:p>
+            <a:r>
+              <a:rPr lang="en-US" sz="900" dirty="0" smtClean="0">
+                <a:solidFill>
+                  <a:srgbClr val="92D050"/>
+                </a:solidFill>
+                <a:latin typeface="Courier New" panose="02070309020205020404" pitchFamily="49" charset="0"/>
+                <a:cs typeface="Courier New" panose="02070309020205020404" pitchFamily="49" charset="0"/>
+              </a:rPr>
+              <a:t>for(</a:t>
+            </a:r>
+            <a:r>
+              <a:rPr lang="en-US" sz="900" dirty="0" err="1" smtClean="0">
+                <a:solidFill>
+                  <a:srgbClr val="92D050"/>
+                </a:solidFill>
+                <a:latin typeface="Courier New" panose="02070309020205020404" pitchFamily="49" charset="0"/>
+                <a:cs typeface="Courier New" panose="02070309020205020404" pitchFamily="49" charset="0"/>
+              </a:rPr>
+              <a:t>int</a:t>
+            </a:r>
+            <a:r>
+              <a:rPr lang="en-US" sz="900" dirty="0" smtClean="0">
+                <a:solidFill>
+                  <a:srgbClr val="92D050"/>
+                </a:solidFill>
+                <a:latin typeface="Courier New" panose="02070309020205020404" pitchFamily="49" charset="0"/>
+                <a:cs typeface="Courier New" panose="02070309020205020404" pitchFamily="49" charset="0"/>
+              </a:rPr>
+              <a:t> </a:t>
+            </a:r>
+            <a:r>
+              <a:rPr lang="en-US" sz="900" dirty="0" err="1">
+                <a:solidFill>
+                  <a:srgbClr val="92D050"/>
+                </a:solidFill>
+                <a:latin typeface="Courier New" panose="02070309020205020404" pitchFamily="49" charset="0"/>
+                <a:cs typeface="Courier New" panose="02070309020205020404" pitchFamily="49" charset="0"/>
+              </a:rPr>
+              <a:t>i</a:t>
+            </a:r>
+            <a:r>
+              <a:rPr lang="en-US" sz="900" dirty="0">
+                <a:solidFill>
+                  <a:srgbClr val="92D050"/>
+                </a:solidFill>
+                <a:latin typeface="Courier New" panose="02070309020205020404" pitchFamily="49" charset="0"/>
+                <a:cs typeface="Courier New" panose="02070309020205020404" pitchFamily="49" charset="0"/>
+              </a:rPr>
+              <a:t> = 0; </a:t>
+            </a:r>
+            <a:r>
+              <a:rPr lang="en-US" sz="900" dirty="0" err="1">
+                <a:solidFill>
+                  <a:srgbClr val="92D050"/>
+                </a:solidFill>
+                <a:latin typeface="Courier New" panose="02070309020205020404" pitchFamily="49" charset="0"/>
+                <a:cs typeface="Courier New" panose="02070309020205020404" pitchFamily="49" charset="0"/>
+              </a:rPr>
+              <a:t>i</a:t>
+            </a:r>
+            <a:r>
+              <a:rPr lang="en-US" sz="900" dirty="0">
+                <a:solidFill>
+                  <a:srgbClr val="92D050"/>
+                </a:solidFill>
+                <a:latin typeface="Courier New" panose="02070309020205020404" pitchFamily="49" charset="0"/>
+                <a:cs typeface="Courier New" panose="02070309020205020404" pitchFamily="49" charset="0"/>
+              </a:rPr>
+              <a:t> &lt; 1024; ++</a:t>
+            </a:r>
+            <a:r>
+              <a:rPr lang="en-US" sz="900" dirty="0" err="1">
+                <a:solidFill>
+                  <a:srgbClr val="92D050"/>
+                </a:solidFill>
+                <a:latin typeface="Courier New" panose="02070309020205020404" pitchFamily="49" charset="0"/>
+                <a:cs typeface="Courier New" panose="02070309020205020404" pitchFamily="49" charset="0"/>
+              </a:rPr>
+              <a:t>i</a:t>
+            </a:r>
+            <a:r>
+              <a:rPr lang="en-US" sz="900" dirty="0">
+                <a:solidFill>
+                  <a:srgbClr val="92D050"/>
+                </a:solidFill>
+                <a:latin typeface="Courier New" panose="02070309020205020404" pitchFamily="49" charset="0"/>
+                <a:cs typeface="Courier New" panose="02070309020205020404" pitchFamily="49" charset="0"/>
+              </a:rPr>
+              <a:t>){</a:t>
+            </a:r>
+          </a:p>
+          <a:p>
+            <a:r>
+              <a:rPr lang="en-US" sz="900" dirty="0">
+                <a:solidFill>
+                  <a:srgbClr val="92D050"/>
+                </a:solidFill>
+                <a:latin typeface="Courier New" panose="02070309020205020404" pitchFamily="49" charset="0"/>
+                <a:cs typeface="Courier New" panose="02070309020205020404" pitchFamily="49" charset="0"/>
+              </a:rPr>
+              <a:t>      </a:t>
+            </a:r>
+            <a:r>
+              <a:rPr lang="en-US" sz="900" dirty="0" err="1">
+                <a:solidFill>
+                  <a:srgbClr val="92D050"/>
+                </a:solidFill>
+                <a:latin typeface="Courier New" panose="02070309020205020404" pitchFamily="49" charset="0"/>
+                <a:cs typeface="Courier New" panose="02070309020205020404" pitchFamily="49" charset="0"/>
+              </a:rPr>
+              <a:t>int</a:t>
+            </a:r>
+            <a:r>
+              <a:rPr lang="en-US" sz="900" dirty="0">
+                <a:solidFill>
+                  <a:srgbClr val="92D050"/>
+                </a:solidFill>
+                <a:latin typeface="Courier New" panose="02070309020205020404" pitchFamily="49" charset="0"/>
+                <a:cs typeface="Courier New" panose="02070309020205020404" pitchFamily="49" charset="0"/>
+              </a:rPr>
+              <a:t>[] array = new </a:t>
+            </a:r>
+            <a:r>
+              <a:rPr lang="en-US" sz="900" dirty="0" err="1">
+                <a:solidFill>
+                  <a:srgbClr val="92D050"/>
+                </a:solidFill>
+                <a:latin typeface="Courier New" panose="02070309020205020404" pitchFamily="49" charset="0"/>
+                <a:cs typeface="Courier New" panose="02070309020205020404" pitchFamily="49" charset="0"/>
+              </a:rPr>
+              <a:t>int</a:t>
+            </a:r>
+            <a:r>
+              <a:rPr lang="en-US" sz="900" dirty="0">
+                <a:solidFill>
+                  <a:srgbClr val="92D050"/>
+                </a:solidFill>
+                <a:latin typeface="Courier New" panose="02070309020205020404" pitchFamily="49" charset="0"/>
+                <a:cs typeface="Courier New" panose="02070309020205020404" pitchFamily="49" charset="0"/>
+              </a:rPr>
+              <a:t>[512];</a:t>
+            </a:r>
+          </a:p>
+          <a:p>
+            <a:r>
+              <a:rPr lang="en-US" sz="900" dirty="0">
+                <a:solidFill>
+                  <a:srgbClr val="92D050"/>
+                </a:solidFill>
+                <a:latin typeface="Courier New" panose="02070309020205020404" pitchFamily="49" charset="0"/>
+                <a:cs typeface="Courier New" panose="02070309020205020404" pitchFamily="49" charset="0"/>
+              </a:rPr>
+              <a:t>      for(</a:t>
+            </a:r>
+            <a:r>
+              <a:rPr lang="en-US" sz="900" dirty="0" err="1">
+                <a:solidFill>
+                  <a:srgbClr val="92D050"/>
+                </a:solidFill>
+                <a:latin typeface="Courier New" panose="02070309020205020404" pitchFamily="49" charset="0"/>
+                <a:cs typeface="Courier New" panose="02070309020205020404" pitchFamily="49" charset="0"/>
+              </a:rPr>
+              <a:t>int</a:t>
+            </a:r>
+            <a:r>
+              <a:rPr lang="en-US" sz="900" dirty="0">
+                <a:solidFill>
+                  <a:srgbClr val="92D050"/>
+                </a:solidFill>
+                <a:latin typeface="Courier New" panose="02070309020205020404" pitchFamily="49" charset="0"/>
+                <a:cs typeface="Courier New" panose="02070309020205020404" pitchFamily="49" charset="0"/>
+              </a:rPr>
+              <a:t> j = 0; j &lt; </a:t>
+            </a:r>
+            <a:r>
+              <a:rPr lang="en-US" sz="900" dirty="0" err="1">
+                <a:solidFill>
+                  <a:srgbClr val="92D050"/>
+                </a:solidFill>
+                <a:latin typeface="Courier New" panose="02070309020205020404" pitchFamily="49" charset="0"/>
+                <a:cs typeface="Courier New" panose="02070309020205020404" pitchFamily="49" charset="0"/>
+              </a:rPr>
+              <a:t>array.length</a:t>
+            </a:r>
+            <a:r>
+              <a:rPr lang="en-US" sz="900" dirty="0">
+                <a:solidFill>
+                  <a:srgbClr val="92D050"/>
+                </a:solidFill>
+                <a:latin typeface="Courier New" panose="02070309020205020404" pitchFamily="49" charset="0"/>
+                <a:cs typeface="Courier New" panose="02070309020205020404" pitchFamily="49" charset="0"/>
+              </a:rPr>
+              <a:t>; ++j){</a:t>
+            </a:r>
+          </a:p>
+          <a:p>
+            <a:r>
+              <a:rPr lang="en-US" sz="900" dirty="0">
+                <a:solidFill>
+                  <a:srgbClr val="92D050"/>
+                </a:solidFill>
+                <a:latin typeface="Courier New" panose="02070309020205020404" pitchFamily="49" charset="0"/>
+                <a:cs typeface="Courier New" panose="02070309020205020404" pitchFamily="49" charset="0"/>
+              </a:rPr>
+              <a:t>        array[j] = j;</a:t>
+            </a:r>
+          </a:p>
+          <a:p>
+            <a:r>
+              <a:rPr lang="en-US" sz="900" dirty="0">
+                <a:solidFill>
+                  <a:srgbClr val="92D050"/>
+                </a:solidFill>
+                <a:latin typeface="Courier New" panose="02070309020205020404" pitchFamily="49" charset="0"/>
+                <a:cs typeface="Courier New" panose="02070309020205020404" pitchFamily="49" charset="0"/>
+              </a:rPr>
+              <a:t>      }</a:t>
+            </a:r>
+          </a:p>
+          <a:p>
+            <a:r>
+              <a:rPr lang="en-US" sz="900" dirty="0">
+                <a:solidFill>
+                  <a:srgbClr val="92D050"/>
+                </a:solidFill>
+                <a:latin typeface="Courier New" panose="02070309020205020404" pitchFamily="49" charset="0"/>
+                <a:cs typeface="Courier New" panose="02070309020205020404" pitchFamily="49" charset="0"/>
+              </a:rPr>
+              <a:t>      </a:t>
+            </a:r>
+            <a:r>
+              <a:rPr lang="en-US" sz="900" dirty="0" err="1">
+                <a:solidFill>
+                  <a:srgbClr val="92D050"/>
+                </a:solidFill>
+                <a:latin typeface="Courier New" panose="02070309020205020404" pitchFamily="49" charset="0"/>
+                <a:cs typeface="Courier New" panose="02070309020205020404" pitchFamily="49" charset="0"/>
+              </a:rPr>
+              <a:t>arrays.add</a:t>
+            </a:r>
+            <a:r>
+              <a:rPr lang="en-US" sz="900" dirty="0">
+                <a:solidFill>
+                  <a:srgbClr val="92D050"/>
+                </a:solidFill>
+                <a:latin typeface="Courier New" panose="02070309020205020404" pitchFamily="49" charset="0"/>
+                <a:cs typeface="Courier New" panose="02070309020205020404" pitchFamily="49" charset="0"/>
+              </a:rPr>
+              <a:t>(array);</a:t>
+            </a:r>
+          </a:p>
+          <a:p>
+            <a:r>
+              <a:rPr lang="en-US" sz="900" dirty="0">
+                <a:solidFill>
+                  <a:srgbClr val="92D050"/>
+                </a:solidFill>
+                <a:latin typeface="Courier New" panose="02070309020205020404" pitchFamily="49" charset="0"/>
+                <a:cs typeface="Courier New" panose="02070309020205020404" pitchFamily="49" charset="0"/>
+              </a:rPr>
+              <a:t>    }</a:t>
+            </a:r>
+          </a:p>
+          <a:p>
+            <a:r>
+              <a:rPr lang="en-US" sz="900" dirty="0">
+                <a:solidFill>
+                  <a:srgbClr val="92D050"/>
+                </a:solidFill>
+                <a:latin typeface="Courier New" panose="02070309020205020404" pitchFamily="49" charset="0"/>
+                <a:cs typeface="Courier New" panose="02070309020205020404" pitchFamily="49" charset="0"/>
+              </a:rPr>
+              <a:t>    </a:t>
+            </a:r>
+          </a:p>
+          <a:p>
+            <a:r>
+              <a:rPr lang="en-US" sz="900" dirty="0">
+                <a:solidFill>
+                  <a:srgbClr val="92D050"/>
+                </a:solidFill>
+                <a:latin typeface="Courier New" panose="02070309020205020404" pitchFamily="49" charset="0"/>
+                <a:cs typeface="Courier New" panose="02070309020205020404" pitchFamily="49" charset="0"/>
+              </a:rPr>
+              <a:t>    </a:t>
+            </a:r>
+            <a:r>
+              <a:rPr lang="en-US" sz="900" dirty="0" err="1">
+                <a:solidFill>
+                  <a:srgbClr val="92D050"/>
+                </a:solidFill>
+                <a:latin typeface="Courier New" panose="02070309020205020404" pitchFamily="49" charset="0"/>
+                <a:cs typeface="Courier New" panose="02070309020205020404" pitchFamily="49" charset="0"/>
+              </a:rPr>
+              <a:t>int</a:t>
+            </a:r>
+            <a:r>
+              <a:rPr lang="en-US" sz="900" dirty="0">
+                <a:solidFill>
+                  <a:srgbClr val="92D050"/>
+                </a:solidFill>
+                <a:latin typeface="Courier New" panose="02070309020205020404" pitchFamily="49" charset="0"/>
+                <a:cs typeface="Courier New" panose="02070309020205020404" pitchFamily="49" charset="0"/>
+              </a:rPr>
+              <a:t>[] sums = </a:t>
+            </a:r>
+            <a:r>
+              <a:rPr lang="en-US" sz="900" dirty="0" err="1">
+                <a:solidFill>
+                  <a:srgbClr val="92D050"/>
+                </a:solidFill>
+                <a:latin typeface="Courier New" panose="02070309020205020404" pitchFamily="49" charset="0"/>
+                <a:cs typeface="Courier New" panose="02070309020205020404" pitchFamily="49" charset="0"/>
+              </a:rPr>
+              <a:t>app.sumArrays</a:t>
+            </a:r>
+            <a:r>
+              <a:rPr lang="en-US" sz="900" dirty="0">
+                <a:solidFill>
+                  <a:srgbClr val="92D050"/>
+                </a:solidFill>
+                <a:latin typeface="Courier New" panose="02070309020205020404" pitchFamily="49" charset="0"/>
+                <a:cs typeface="Courier New" panose="02070309020205020404" pitchFamily="49" charset="0"/>
+              </a:rPr>
+              <a:t>(arrays);</a:t>
+            </a:r>
+          </a:p>
+          <a:p>
+            <a:r>
+              <a:rPr lang="en-US" sz="900" dirty="0">
+                <a:solidFill>
+                  <a:srgbClr val="92D050"/>
+                </a:solidFill>
+                <a:latin typeface="Courier New" panose="02070309020205020404" pitchFamily="49" charset="0"/>
+                <a:cs typeface="Courier New" panose="02070309020205020404" pitchFamily="49" charset="0"/>
+              </a:rPr>
+              <a:t>    for(</a:t>
+            </a:r>
+            <a:r>
+              <a:rPr lang="en-US" sz="900" dirty="0" err="1">
+                <a:solidFill>
+                  <a:srgbClr val="92D050"/>
+                </a:solidFill>
+                <a:latin typeface="Courier New" panose="02070309020205020404" pitchFamily="49" charset="0"/>
+                <a:cs typeface="Courier New" panose="02070309020205020404" pitchFamily="49" charset="0"/>
+              </a:rPr>
+              <a:t>int</a:t>
+            </a:r>
+            <a:r>
+              <a:rPr lang="en-US" sz="900" dirty="0">
+                <a:solidFill>
+                  <a:srgbClr val="92D050"/>
+                </a:solidFill>
+                <a:latin typeface="Courier New" panose="02070309020205020404" pitchFamily="49" charset="0"/>
+                <a:cs typeface="Courier New" panose="02070309020205020404" pitchFamily="49" charset="0"/>
+              </a:rPr>
+              <a:t> </a:t>
+            </a:r>
+            <a:r>
+              <a:rPr lang="en-US" sz="900" dirty="0" err="1">
+                <a:solidFill>
+                  <a:srgbClr val="92D050"/>
+                </a:solidFill>
+                <a:latin typeface="Courier New" panose="02070309020205020404" pitchFamily="49" charset="0"/>
+                <a:cs typeface="Courier New" panose="02070309020205020404" pitchFamily="49" charset="0"/>
+              </a:rPr>
+              <a:t>i</a:t>
+            </a:r>
+            <a:r>
+              <a:rPr lang="en-US" sz="900" dirty="0">
+                <a:solidFill>
+                  <a:srgbClr val="92D050"/>
+                </a:solidFill>
+                <a:latin typeface="Courier New" panose="02070309020205020404" pitchFamily="49" charset="0"/>
+                <a:cs typeface="Courier New" panose="02070309020205020404" pitchFamily="49" charset="0"/>
+              </a:rPr>
+              <a:t> = 0; </a:t>
+            </a:r>
+            <a:r>
+              <a:rPr lang="en-US" sz="900" dirty="0" err="1">
+                <a:solidFill>
+                  <a:srgbClr val="92D050"/>
+                </a:solidFill>
+                <a:latin typeface="Courier New" panose="02070309020205020404" pitchFamily="49" charset="0"/>
+                <a:cs typeface="Courier New" panose="02070309020205020404" pitchFamily="49" charset="0"/>
+              </a:rPr>
+              <a:t>i</a:t>
+            </a:r>
+            <a:r>
+              <a:rPr lang="en-US" sz="900" dirty="0">
+                <a:solidFill>
+                  <a:srgbClr val="92D050"/>
+                </a:solidFill>
+                <a:latin typeface="Courier New" panose="02070309020205020404" pitchFamily="49" charset="0"/>
+                <a:cs typeface="Courier New" panose="02070309020205020404" pitchFamily="49" charset="0"/>
+              </a:rPr>
+              <a:t> &lt; </a:t>
+            </a:r>
+            <a:r>
+              <a:rPr lang="en-US" sz="900" dirty="0" err="1">
+                <a:solidFill>
+                  <a:srgbClr val="92D050"/>
+                </a:solidFill>
+                <a:latin typeface="Courier New" panose="02070309020205020404" pitchFamily="49" charset="0"/>
+                <a:cs typeface="Courier New" panose="02070309020205020404" pitchFamily="49" charset="0"/>
+              </a:rPr>
+              <a:t>sums.length</a:t>
+            </a:r>
+            <a:r>
+              <a:rPr lang="en-US" sz="900" dirty="0">
+                <a:solidFill>
+                  <a:srgbClr val="92D050"/>
+                </a:solidFill>
+                <a:latin typeface="Courier New" panose="02070309020205020404" pitchFamily="49" charset="0"/>
+                <a:cs typeface="Courier New" panose="02070309020205020404" pitchFamily="49" charset="0"/>
+              </a:rPr>
+              <a:t>; ++</a:t>
+            </a:r>
+            <a:r>
+              <a:rPr lang="en-US" sz="900" dirty="0" err="1">
+                <a:solidFill>
+                  <a:srgbClr val="92D050"/>
+                </a:solidFill>
+                <a:latin typeface="Courier New" panose="02070309020205020404" pitchFamily="49" charset="0"/>
+                <a:cs typeface="Courier New" panose="02070309020205020404" pitchFamily="49" charset="0"/>
+              </a:rPr>
+              <a:t>i</a:t>
+            </a:r>
+            <a:r>
+              <a:rPr lang="en-US" sz="900" dirty="0">
+                <a:solidFill>
+                  <a:srgbClr val="92D050"/>
+                </a:solidFill>
+                <a:latin typeface="Courier New" panose="02070309020205020404" pitchFamily="49" charset="0"/>
+                <a:cs typeface="Courier New" panose="02070309020205020404" pitchFamily="49" charset="0"/>
+              </a:rPr>
+              <a:t>){</a:t>
+            </a:r>
+          </a:p>
+          <a:p>
+            <a:r>
+              <a:rPr lang="en-US" sz="900" dirty="0">
+                <a:solidFill>
+                  <a:srgbClr val="92D050"/>
+                </a:solidFill>
+                <a:latin typeface="Courier New" panose="02070309020205020404" pitchFamily="49" charset="0"/>
+                <a:cs typeface="Courier New" panose="02070309020205020404" pitchFamily="49" charset="0"/>
+              </a:rPr>
+              <a:t>      </a:t>
+            </a:r>
+            <a:r>
+              <a:rPr lang="en-US" sz="900" dirty="0" err="1">
+                <a:solidFill>
+                  <a:srgbClr val="92D050"/>
+                </a:solidFill>
+                <a:latin typeface="Courier New" panose="02070309020205020404" pitchFamily="49" charset="0"/>
+                <a:cs typeface="Courier New" panose="02070309020205020404" pitchFamily="49" charset="0"/>
+              </a:rPr>
+              <a:t>System.out.println</a:t>
+            </a:r>
+            <a:r>
+              <a:rPr lang="en-US" sz="900" dirty="0">
+                <a:solidFill>
+                  <a:srgbClr val="92D050"/>
+                </a:solidFill>
+                <a:latin typeface="Courier New" panose="02070309020205020404" pitchFamily="49" charset="0"/>
+                <a:cs typeface="Courier New" panose="02070309020205020404" pitchFamily="49" charset="0"/>
+              </a:rPr>
+              <a:t>("sum for arrays["+</a:t>
+            </a:r>
+            <a:r>
+              <a:rPr lang="en-US" sz="900" dirty="0" err="1">
+                <a:solidFill>
+                  <a:srgbClr val="92D050"/>
+                </a:solidFill>
+                <a:latin typeface="Courier New" panose="02070309020205020404" pitchFamily="49" charset="0"/>
+                <a:cs typeface="Courier New" panose="02070309020205020404" pitchFamily="49" charset="0"/>
+              </a:rPr>
+              <a:t>i</a:t>
+            </a:r>
+            <a:r>
+              <a:rPr lang="en-US" sz="900" dirty="0">
+                <a:solidFill>
+                  <a:srgbClr val="92D050"/>
+                </a:solidFill>
+                <a:latin typeface="Courier New" panose="02070309020205020404" pitchFamily="49" charset="0"/>
+                <a:cs typeface="Courier New" panose="02070309020205020404" pitchFamily="49" charset="0"/>
+              </a:rPr>
+              <a:t>+"]: "+sums[</a:t>
+            </a:r>
+            <a:r>
+              <a:rPr lang="en-US" sz="900" dirty="0" err="1">
+                <a:solidFill>
+                  <a:srgbClr val="92D050"/>
+                </a:solidFill>
+                <a:latin typeface="Courier New" panose="02070309020205020404" pitchFamily="49" charset="0"/>
+                <a:cs typeface="Courier New" panose="02070309020205020404" pitchFamily="49" charset="0"/>
+              </a:rPr>
+              <a:t>i</a:t>
+            </a:r>
+            <a:r>
+              <a:rPr lang="en-US" sz="900" dirty="0">
+                <a:solidFill>
+                  <a:srgbClr val="92D050"/>
+                </a:solidFill>
+                <a:latin typeface="Courier New" panose="02070309020205020404" pitchFamily="49" charset="0"/>
+                <a:cs typeface="Courier New" panose="02070309020205020404" pitchFamily="49" charset="0"/>
+              </a:rPr>
+              <a:t>]);</a:t>
+            </a:r>
+          </a:p>
+          <a:p>
+            <a:r>
+              <a:rPr lang="en-US" sz="900" dirty="0">
+                <a:solidFill>
+                  <a:srgbClr val="92D050"/>
+                </a:solidFill>
+                <a:latin typeface="Courier New" panose="02070309020205020404" pitchFamily="49" charset="0"/>
+                <a:cs typeface="Courier New" panose="02070309020205020404" pitchFamily="49" charset="0"/>
+              </a:rPr>
+              <a:t>    }</a:t>
+            </a:r>
+          </a:p>
+          <a:p>
+            <a:r>
+              <a:rPr lang="en-US" sz="900" dirty="0">
+                <a:solidFill>
+                  <a:srgbClr val="92D050"/>
+                </a:solidFill>
+                <a:latin typeface="Courier New" panose="02070309020205020404" pitchFamily="49" charset="0"/>
+                <a:cs typeface="Courier New" panose="02070309020205020404" pitchFamily="49" charset="0"/>
+              </a:rPr>
+              <a:t>  }</a:t>
+            </a:r>
+          </a:p>
+          <a:p>
+            <a:r>
+              <a:rPr lang="en-US" sz="900" dirty="0">
+                <a:solidFill>
+                  <a:srgbClr val="92D050"/>
+                </a:solidFill>
+                <a:latin typeface="Courier New" panose="02070309020205020404" pitchFamily="49" charset="0"/>
+                <a:cs typeface="Courier New" panose="02070309020205020404" pitchFamily="49" charset="0"/>
+              </a:rPr>
+              <a:t>}</a:t>
+            </a:r>
+          </a:p>
+        </p:txBody>
+      </p:sp>
+      <p:sp>
+        <p:nvSpPr>
+          <p:cNvPr id="16" name="TextBox 15"/>
+          <p:cNvSpPr txBox="1"/>
+          <p:nvPr/>
+        </p:nvSpPr>
+        <p:spPr>
+          <a:xfrm>
+            <a:off x="134829" y="5880070"/>
+            <a:ext cx="4211705" cy="830997"/>
+          </a:xfrm>
+          <a:prstGeom prst="rect">
+            <a:avLst/>
+          </a:prstGeom>
+          <a:noFill/>
+        </p:spPr>
+        <p:txBody>
+          <a:bodyPr wrap="square" rtlCol="0">
+            <a:spAutoFit/>
+          </a:bodyPr>
+          <a:lstStyle/>
+          <a:p>
+            <a:r>
+              <a:rPr lang="en-GB" sz="2400" dirty="0" smtClean="0">
+                <a:latin typeface="Comic Sans MS" panose="030F0702030302020204" pitchFamily="66" charset="0"/>
+                <a:cs typeface="Consolas" panose="020B0609020204030204" pitchFamily="49" charset="0"/>
+              </a:rPr>
+              <a:t>…instead of</a:t>
+            </a:r>
+          </a:p>
+          <a:p>
+            <a:r>
+              <a:rPr lang="en-GB" sz="2400" dirty="0" smtClean="0">
+                <a:latin typeface="Comic Sans MS" panose="030F0702030302020204" pitchFamily="66" charset="0"/>
+                <a:cs typeface="Consolas" panose="020B0609020204030204" pitchFamily="49" charset="0"/>
+              </a:rPr>
+              <a:t>“(0 until 512).</a:t>
+            </a:r>
+            <a:r>
+              <a:rPr lang="en-GB" sz="2400" dirty="0" err="1" smtClean="0">
+                <a:latin typeface="Comic Sans MS" panose="030F0702030302020204" pitchFamily="66" charset="0"/>
+                <a:cs typeface="Consolas" panose="020B0609020204030204" pitchFamily="49" charset="0"/>
+              </a:rPr>
+              <a:t>cl.sum</a:t>
+            </a:r>
+            <a:r>
+              <a:rPr lang="en-GB" sz="2400" dirty="0" smtClean="0">
+                <a:latin typeface="Comic Sans MS" panose="030F0702030302020204" pitchFamily="66" charset="0"/>
+                <a:cs typeface="Consolas" panose="020B0609020204030204" pitchFamily="49" charset="0"/>
+              </a:rPr>
+              <a:t>”</a:t>
+            </a:r>
+            <a:endParaRPr lang="en-GB" sz="2400" dirty="0">
+              <a:latin typeface="Comic Sans MS" panose="030F0702030302020204" pitchFamily="66" charset="0"/>
+              <a:cs typeface="Consolas" panose="020B0609020204030204" pitchFamily="49" charset="0"/>
+            </a:endParaRPr>
+          </a:p>
+        </p:txBody>
+      </p:sp>
+    </p:spTree>
+    <p:extLst>
+      <p:ext uri="{BB962C8B-B14F-4D97-AF65-F5344CB8AC3E}">
+        <p14:creationId xmlns:p14="http://schemas.microsoft.com/office/powerpoint/2010/main" val="2230775740"/>
+      </p:ext>
+    </p:extLst>
+  </p:cSld>
+  <p:clrMapOvr>
+    <a:masterClrMapping/>
+  </p:clrMapOvr>
+  <p:timing>
+    <p:tnLst>
+      <p:par>
+        <p:cTn id="1" dur="indefinite" restart="never" nodeType="tmRoot"/>
+      </p:par>
+    </p:tnLst>
+  </p:timing>
+</p:sld>
+</file>
+
+<file path=ppt/slides/slide6.xml><?xml version="1.0" encoding="utf-8"?>
+<p:sld xmlns:a="http://schemas.openxmlformats.org/drawingml/2006/main" xmlns:r="http://schemas.openxmlformats.org/officeDocument/2006/relationships" xmlns:p="http://schemas.openxmlformats.org/presentationml/2006/main">
+  <p:cSld>
+    <p:spTree>
+      <p:nvGrpSpPr>
+        <p:cNvPr id="1" name=""/>
+        <p:cNvGrpSpPr/>
+        <p:nvPr/>
+      </p:nvGrpSpPr>
+      <p:grpSpPr>
+        <a:xfrm>
+          <a:off x="0" y="0"/>
+          <a:ext cx="0" cy="0"/>
+          <a:chOff x="0" y="0"/>
+          <a:chExt cx="0" cy="0"/>
+        </a:xfrm>
+      </p:grpSpPr>
+      <p:sp>
+        <p:nvSpPr>
+          <p:cNvPr id="13" name="Title 1"/>
+          <p:cNvSpPr>
+            <a:spLocks noGrp="1"/>
+          </p:cNvSpPr>
+          <p:nvPr>
+            <p:ph type="title"/>
+          </p:nvPr>
+        </p:nvSpPr>
+        <p:spPr>
+          <a:xfrm>
+            <a:off x="457200" y="274638"/>
+            <a:ext cx="8229600" cy="1143000"/>
+          </a:xfrm>
+        </p:spPr>
+        <p:txBody>
+          <a:bodyPr>
+            <a:normAutofit/>
+          </a:bodyPr>
+          <a:lstStyle/>
+          <a:p>
+            <a:pPr algn="l"/>
+            <a:r>
+              <a:rPr lang="en-GB" dirty="0" err="1" smtClean="0">
+                <a:solidFill>
+                  <a:schemeClr val="bg1">
+                    <a:lumMod val="50000"/>
+                  </a:schemeClr>
+                </a:solidFill>
+                <a:latin typeface="Comic Sans MS"/>
+              </a:rPr>
+              <a:t>ScalaCL</a:t>
+            </a:r>
+            <a:r>
+              <a:rPr lang="en-GB" dirty="0" smtClean="0">
+                <a:solidFill>
+                  <a:schemeClr val="bg1">
+                    <a:lumMod val="50000"/>
+                  </a:schemeClr>
+                </a:solidFill>
+                <a:latin typeface="Comic Sans MS"/>
+              </a:rPr>
+              <a:t> status</a:t>
+            </a:r>
+            <a:endParaRPr lang="en-US" dirty="0"/>
+          </a:p>
+        </p:txBody>
+      </p:sp>
+      <p:sp>
+        <p:nvSpPr>
+          <p:cNvPr id="4" name="TextBox 3"/>
+          <p:cNvSpPr txBox="1"/>
+          <p:nvPr/>
+        </p:nvSpPr>
+        <p:spPr>
+          <a:xfrm>
+            <a:off x="563672" y="1691014"/>
+            <a:ext cx="5715294" cy="3970318"/>
+          </a:xfrm>
+          <a:prstGeom prst="rect">
+            <a:avLst/>
+          </a:prstGeom>
+          <a:noFill/>
+        </p:spPr>
+        <p:txBody>
+          <a:bodyPr wrap="square" rtlCol="0">
+            <a:spAutoFit/>
+          </a:bodyPr>
+          <a:lstStyle/>
+          <a:p>
+            <a:pPr marL="285750" indent="-285750">
+              <a:buFont typeface="Arial" panose="020B0604020202020204" pitchFamily="34" charset="0"/>
+              <a:buChar char="•"/>
+            </a:pPr>
+            <a:r>
+              <a:rPr lang="en-GB" dirty="0" smtClean="0">
+                <a:latin typeface="Comic Sans MS" panose="030F0702030302020204" pitchFamily="66" charset="0"/>
+                <a:cs typeface="Consolas" panose="020B0609020204030204" pitchFamily="49" charset="0"/>
+              </a:rPr>
+              <a:t>Free and open source</a:t>
+            </a:r>
+          </a:p>
+          <a:p>
+            <a:pPr marL="285750" indent="-285750">
+              <a:buFont typeface="Arial" panose="020B0604020202020204" pitchFamily="34" charset="0"/>
+              <a:buChar char="•"/>
+            </a:pPr>
+            <a:r>
+              <a:rPr lang="en-GB" dirty="0" smtClean="0">
+                <a:latin typeface="Comic Sans MS" panose="030F0702030302020204" pitchFamily="66" charset="0"/>
+                <a:cs typeface="Consolas" panose="020B0609020204030204" pitchFamily="49" charset="0"/>
+              </a:rPr>
+              <a:t>6 lines to enable in a SBT project</a:t>
+            </a:r>
+          </a:p>
+          <a:p>
+            <a:pPr marL="285750" indent="-285750">
+              <a:buFont typeface="Arial" panose="020B0604020202020204" pitchFamily="34" charset="0"/>
+              <a:buChar char="•"/>
+            </a:pPr>
+            <a:r>
+              <a:rPr lang="en-GB" dirty="0" smtClean="0">
+                <a:latin typeface="Comic Sans MS" panose="030F0702030302020204" pitchFamily="66" charset="0"/>
+                <a:cs typeface="Consolas" panose="020B0609020204030204" pitchFamily="49" charset="0"/>
+              </a:rPr>
+              <a:t>Some operations might still be running on the CPU.  The compiler can warn you.</a:t>
+            </a:r>
+          </a:p>
+          <a:p>
+            <a:pPr marL="285750" indent="-285750">
+              <a:buFont typeface="Arial" panose="020B0604020202020204" pitchFamily="34" charset="0"/>
+              <a:buChar char="•"/>
+            </a:pPr>
+            <a:endParaRPr lang="en-GB" dirty="0">
+              <a:latin typeface="Comic Sans MS" panose="030F0702030302020204" pitchFamily="66" charset="0"/>
+              <a:cs typeface="Consolas" panose="020B0609020204030204" pitchFamily="49" charset="0"/>
+            </a:endParaRPr>
+          </a:p>
+          <a:p>
+            <a:pPr marL="285750" indent="-285750">
+              <a:buFont typeface="Arial" panose="020B0604020202020204" pitchFamily="34" charset="0"/>
+              <a:buChar char="•"/>
+            </a:pPr>
+            <a:endParaRPr lang="en-GB" dirty="0" smtClean="0">
+              <a:latin typeface="Comic Sans MS" panose="030F0702030302020204" pitchFamily="66" charset="0"/>
+              <a:cs typeface="Consolas" panose="020B0609020204030204" pitchFamily="49" charset="0"/>
+            </a:endParaRPr>
+          </a:p>
+          <a:p>
+            <a:pPr marL="285750" indent="-285750">
+              <a:buFont typeface="Arial" panose="020B0604020202020204" pitchFamily="34" charset="0"/>
+              <a:buChar char="•"/>
+            </a:pPr>
+            <a:r>
+              <a:rPr lang="en-GB" dirty="0" smtClean="0">
+                <a:latin typeface="Comic Sans MS" panose="030F0702030302020204" pitchFamily="66" charset="0"/>
+                <a:cs typeface="Consolas" panose="020B0609020204030204" pitchFamily="49" charset="0"/>
+              </a:rPr>
+              <a:t>Two different versions</a:t>
+            </a:r>
+            <a:endParaRPr lang="en-GB" dirty="0">
+              <a:latin typeface="Comic Sans MS" panose="030F0702030302020204" pitchFamily="66" charset="0"/>
+              <a:cs typeface="Consolas" panose="020B0609020204030204" pitchFamily="49" charset="0"/>
+            </a:endParaRPr>
+          </a:p>
+          <a:p>
+            <a:pPr marL="285750" indent="-285750">
+              <a:buFont typeface="Arial" panose="020B0604020202020204" pitchFamily="34" charset="0"/>
+              <a:buChar char="•"/>
+            </a:pPr>
+            <a:r>
+              <a:rPr lang="en-GB" dirty="0" smtClean="0">
+                <a:latin typeface="Comic Sans MS" panose="030F0702030302020204" pitchFamily="66" charset="0"/>
+                <a:cs typeface="Consolas" panose="020B0609020204030204" pitchFamily="49" charset="0"/>
+                <a:hlinkClick r:id="rId2"/>
+              </a:rPr>
+              <a:t>https</a:t>
+            </a:r>
+            <a:r>
+              <a:rPr lang="en-GB" dirty="0">
+                <a:latin typeface="Comic Sans MS" panose="030F0702030302020204" pitchFamily="66" charset="0"/>
+                <a:cs typeface="Consolas" panose="020B0609020204030204" pitchFamily="49" charset="0"/>
+                <a:hlinkClick r:id="rId2"/>
+              </a:rPr>
+              <a:t>://code.google.com/p/scalacl</a:t>
+            </a:r>
+            <a:r>
+              <a:rPr lang="en-GB" dirty="0" smtClean="0">
+                <a:latin typeface="Comic Sans MS" panose="030F0702030302020204" pitchFamily="66" charset="0"/>
+                <a:cs typeface="Consolas" panose="020B0609020204030204" pitchFamily="49" charset="0"/>
+                <a:hlinkClick r:id="rId2"/>
+              </a:rPr>
+              <a:t>/</a:t>
+            </a:r>
+            <a:endParaRPr lang="en-GB" dirty="0" smtClean="0">
+              <a:latin typeface="Comic Sans MS" panose="030F0702030302020204" pitchFamily="66" charset="0"/>
+              <a:cs typeface="Consolas" panose="020B0609020204030204" pitchFamily="49" charset="0"/>
+            </a:endParaRPr>
+          </a:p>
+          <a:p>
+            <a:pPr marL="742950" lvl="1" indent="-285750">
+              <a:buFont typeface="Arial" panose="020B0604020202020204" pitchFamily="34" charset="0"/>
+              <a:buChar char="•"/>
+            </a:pPr>
+            <a:r>
+              <a:rPr lang="en-GB" dirty="0">
+                <a:latin typeface="Comic Sans MS" panose="030F0702030302020204" pitchFamily="66" charset="0"/>
+                <a:cs typeface="Consolas" panose="020B0609020204030204" pitchFamily="49" charset="0"/>
+              </a:rPr>
+              <a:t>A Scala compiler </a:t>
+            </a:r>
+            <a:r>
+              <a:rPr lang="en-GB" dirty="0" smtClean="0">
+                <a:latin typeface="Comic Sans MS" panose="030F0702030302020204" pitchFamily="66" charset="0"/>
+                <a:cs typeface="Consolas" panose="020B0609020204030204" pitchFamily="49" charset="0"/>
+              </a:rPr>
+              <a:t>plugin</a:t>
+            </a:r>
+          </a:p>
+          <a:p>
+            <a:pPr marL="742950" lvl="1" indent="-285750">
+              <a:buFont typeface="Arial" panose="020B0604020202020204" pitchFamily="34" charset="0"/>
+              <a:buChar char="•"/>
+            </a:pPr>
+            <a:r>
+              <a:rPr lang="en-GB" dirty="0" smtClean="0">
+                <a:latin typeface="Comic Sans MS" panose="030F0702030302020204" pitchFamily="66" charset="0"/>
+                <a:cs typeface="Consolas" panose="020B0609020204030204" pitchFamily="49" charset="0"/>
+              </a:rPr>
+              <a:t>Functional, </a:t>
+            </a:r>
+            <a:r>
+              <a:rPr lang="en-GB" dirty="0">
+                <a:latin typeface="Comic Sans MS" panose="030F0702030302020204" pitchFamily="66" charset="0"/>
+                <a:cs typeface="Consolas" panose="020B0609020204030204" pitchFamily="49" charset="0"/>
+              </a:rPr>
+              <a:t>not production ready</a:t>
+            </a:r>
+            <a:endParaRPr lang="en-GB" dirty="0" smtClean="0">
+              <a:latin typeface="Comic Sans MS" panose="030F0702030302020204" pitchFamily="66" charset="0"/>
+              <a:cs typeface="Consolas" panose="020B0609020204030204" pitchFamily="49" charset="0"/>
+            </a:endParaRPr>
+          </a:p>
+          <a:p>
+            <a:pPr marL="285750" indent="-285750">
+              <a:buFont typeface="Arial" panose="020B0604020202020204" pitchFamily="34" charset="0"/>
+              <a:buChar char="•"/>
+            </a:pPr>
+            <a:r>
+              <a:rPr lang="en-GB" dirty="0" smtClean="0">
+                <a:latin typeface="Comic Sans MS" panose="030F0702030302020204" pitchFamily="66" charset="0"/>
+                <a:cs typeface="Consolas" panose="020B0609020204030204" pitchFamily="49" charset="0"/>
+                <a:hlinkClick r:id="rId3"/>
+              </a:rPr>
+              <a:t>https</a:t>
+            </a:r>
+            <a:r>
+              <a:rPr lang="en-GB" dirty="0">
+                <a:latin typeface="Comic Sans MS" panose="030F0702030302020204" pitchFamily="66" charset="0"/>
+                <a:cs typeface="Consolas" panose="020B0609020204030204" pitchFamily="49" charset="0"/>
+                <a:hlinkClick r:id="rId3"/>
+              </a:rPr>
+              <a:t>://</a:t>
+            </a:r>
+            <a:r>
+              <a:rPr lang="en-GB" dirty="0" smtClean="0">
+                <a:latin typeface="Comic Sans MS" panose="030F0702030302020204" pitchFamily="66" charset="0"/>
+                <a:cs typeface="Consolas" panose="020B0609020204030204" pitchFamily="49" charset="0"/>
+                <a:hlinkClick r:id="rId3"/>
+              </a:rPr>
+              <a:t>github.com/ochafik/ScalaCL</a:t>
+            </a:r>
+            <a:endParaRPr lang="en-GB" dirty="0" smtClean="0">
+              <a:latin typeface="Comic Sans MS" panose="030F0702030302020204" pitchFamily="66" charset="0"/>
+              <a:cs typeface="Consolas" panose="020B0609020204030204" pitchFamily="49" charset="0"/>
+            </a:endParaRPr>
+          </a:p>
+          <a:p>
+            <a:pPr marL="742950" lvl="1" indent="-285750">
+              <a:buFont typeface="Arial" panose="020B0604020202020204" pitchFamily="34" charset="0"/>
+              <a:buChar char="•"/>
+            </a:pPr>
+            <a:r>
+              <a:rPr lang="en-GB" dirty="0" smtClean="0">
+                <a:latin typeface="Comic Sans MS" panose="030F0702030302020204" pitchFamily="66" charset="0"/>
+                <a:cs typeface="Consolas" panose="020B0609020204030204" pitchFamily="49" charset="0"/>
+              </a:rPr>
+              <a:t>Implemented using Scala macros</a:t>
+            </a:r>
+          </a:p>
+          <a:p>
+            <a:pPr marL="742950" lvl="1" indent="-285750">
+              <a:buFont typeface="Arial" panose="020B0604020202020204" pitchFamily="34" charset="0"/>
+              <a:buChar char="•"/>
+            </a:pPr>
+            <a:r>
+              <a:rPr lang="en-GB" dirty="0" smtClean="0">
+                <a:latin typeface="Comic Sans MS" panose="030F0702030302020204" pitchFamily="66" charset="0"/>
+                <a:cs typeface="Consolas" panose="020B0609020204030204" pitchFamily="49" charset="0"/>
+              </a:rPr>
+              <a:t>Work-in-progress, not yet functional</a:t>
+            </a:r>
+          </a:p>
+          <a:p>
+            <a:pPr marL="285750" indent="-285750">
+              <a:buFont typeface="Arial" panose="020B0604020202020204" pitchFamily="34" charset="0"/>
+              <a:buChar char="•"/>
+            </a:pPr>
+            <a:endParaRPr lang="en-GB" dirty="0">
+              <a:latin typeface="Comic Sans MS" panose="030F0702030302020204" pitchFamily="66" charset="0"/>
+              <a:cs typeface="Consolas" panose="020B0609020204030204" pitchFamily="49" charset="0"/>
+            </a:endParaRPr>
+          </a:p>
+        </p:txBody>
+      </p:sp>
+    </p:spTree>
+    <p:extLst>
+      <p:ext uri="{BB962C8B-B14F-4D97-AF65-F5344CB8AC3E}">
+        <p14:creationId xmlns:p14="http://schemas.microsoft.com/office/powerpoint/2010/main" val="428300527"/>
+      </p:ext>
+    </p:extLst>
+  </p:cSld>
+  <p:clrMapOvr>
+    <a:masterClrMapping/>
+  </p:clrMapOvr>
+  <p:timing>
+    <p:tnLst>
+      <p:par>
+        <p:cTn id="1" dur="indefinite" restart="never" nodeType="tmRoot"/>
+      </p:par>
+    </p:tnLst>
+  </p:timing>
+</p:sld>
+</file>
+
+<file path=ppt/slides/slide7.xml><?xml version="1.0" encoding="utf-8"?>
 <p:sld xmlns:a="http://schemas.openxmlformats.org/drawingml/2006/main" xmlns:r="http://schemas.openxmlformats.org/officeDocument/2006/relationships" xmlns:p="http://schemas.openxmlformats.org/presentationml/2006/main">
   <p:cSld>
     <p:spTree>

</xml_diff>

<commit_message>
I didnt save ...
</commit_message>
<xml_diff>
--- a/ScalaCL_Chissel.pptx
+++ b/ScalaCL_Chissel.pptx
@@ -3572,7 +3572,7 @@
         <p:spPr>
           <a:xfrm>
             <a:off x="889348" y="1691014"/>
-            <a:ext cx="5320687" cy="1754326"/>
+            <a:ext cx="5320687" cy="2031325"/>
           </a:xfrm>
           <a:prstGeom prst="rect">
             <a:avLst/>
@@ -3691,12 +3691,18 @@
               <a:buChar char="•"/>
             </a:pPr>
             <a:r>
-              <a:rPr lang="en-GB" smtClean="0">
+              <a:rPr lang="en-GB" dirty="0" smtClean="0">
                 <a:latin typeface="Comic Sans MS" panose="030F0702030302020204" pitchFamily="66" charset="0"/>
                 <a:cs typeface="Consolas" panose="020B0609020204030204" pitchFamily="49" charset="0"/>
               </a:rPr>
               <a:t>Most graphics cards</a:t>
             </a:r>
+          </a:p>
+          <a:p>
+            <a:pPr marL="742950" lvl="1" indent="-285750">
+              <a:buFont typeface="Arial" panose="020B0604020202020204" pitchFamily="34" charset="0"/>
+              <a:buChar char="•"/>
+            </a:pPr>
             <a:endParaRPr lang="en-GB" dirty="0" smtClean="0">
               <a:latin typeface="Comic Sans MS" panose="030F0702030302020204" pitchFamily="66" charset="0"/>
               <a:cs typeface="Consolas" panose="020B0609020204030204" pitchFamily="49" charset="0"/>

</xml_diff>

<commit_message>
last minute changes, seem a bit empty, 2 more pictures
</commit_message>
<xml_diff>
--- a/ScalaCL_Chissel.pptx
+++ b/ScalaCL_Chissel.pptx
@@ -6526,7 +6526,7 @@
           <a:p>
             <a:fld id="{067803CE-B60F-43EB-9075-5B30E94D311F}" type="datetimeFigureOut">
               <a:rPr lang="en-US" smtClean="0"/>
-              <a:t>7/6/2014</a:t>
+              <a:t>7/10/2014</a:t>
             </a:fld>
             <a:endParaRPr lang="en-US"/>
           </a:p>
@@ -6975,7 +6975,7 @@
           <a:p>
             <a:fld id="{9B6A8A6C-B969-4849-A48A-2FD437CE6A36}" type="datetimeFigureOut">
               <a:rPr lang="en-US" smtClean="0"/>
-              <a:t>7/6/2014</a:t>
+              <a:t>7/10/2014</a:t>
             </a:fld>
             <a:endParaRPr lang="en-US"/>
           </a:p>
@@ -7140,7 +7140,7 @@
           <a:p>
             <a:fld id="{9B6A8A6C-B969-4849-A48A-2FD437CE6A36}" type="datetimeFigureOut">
               <a:rPr lang="en-US" smtClean="0"/>
-              <a:t>7/6/2014</a:t>
+              <a:t>7/10/2014</a:t>
             </a:fld>
             <a:endParaRPr lang="en-US"/>
           </a:p>
@@ -7315,7 +7315,7 @@
           <a:p>
             <a:fld id="{9B6A8A6C-B969-4849-A48A-2FD437CE6A36}" type="datetimeFigureOut">
               <a:rPr lang="en-US" smtClean="0"/>
-              <a:t>7/6/2014</a:t>
+              <a:t>7/10/2014</a:t>
             </a:fld>
             <a:endParaRPr lang="en-US"/>
           </a:p>
@@ -7480,7 +7480,7 @@
           <a:p>
             <a:fld id="{9B6A8A6C-B969-4849-A48A-2FD437CE6A36}" type="datetimeFigureOut">
               <a:rPr lang="en-US" smtClean="0"/>
-              <a:t>7/6/2014</a:t>
+              <a:t>7/10/2014</a:t>
             </a:fld>
             <a:endParaRPr lang="en-US"/>
           </a:p>
@@ -7721,7 +7721,7 @@
           <a:p>
             <a:fld id="{9B6A8A6C-B969-4849-A48A-2FD437CE6A36}" type="datetimeFigureOut">
               <a:rPr lang="en-US" smtClean="0"/>
-              <a:t>7/6/2014</a:t>
+              <a:t>7/10/2014</a:t>
             </a:fld>
             <a:endParaRPr lang="en-US"/>
           </a:p>
@@ -8004,7 +8004,7 @@
           <a:p>
             <a:fld id="{9B6A8A6C-B969-4849-A48A-2FD437CE6A36}" type="datetimeFigureOut">
               <a:rPr lang="en-US" smtClean="0"/>
-              <a:t>7/6/2014</a:t>
+              <a:t>7/10/2014</a:t>
             </a:fld>
             <a:endParaRPr lang="en-US"/>
           </a:p>
@@ -8421,7 +8421,7 @@
           <a:p>
             <a:fld id="{9B6A8A6C-B969-4849-A48A-2FD437CE6A36}" type="datetimeFigureOut">
               <a:rPr lang="en-US" smtClean="0"/>
-              <a:t>7/6/2014</a:t>
+              <a:t>7/10/2014</a:t>
             </a:fld>
             <a:endParaRPr lang="en-US"/>
           </a:p>
@@ -8534,7 +8534,7 @@
           <a:p>
             <a:fld id="{9B6A8A6C-B969-4849-A48A-2FD437CE6A36}" type="datetimeFigureOut">
               <a:rPr lang="en-US" smtClean="0"/>
-              <a:t>7/6/2014</a:t>
+              <a:t>7/10/2014</a:t>
             </a:fld>
             <a:endParaRPr lang="en-US"/>
           </a:p>
@@ -8624,7 +8624,7 @@
           <a:p>
             <a:fld id="{9B6A8A6C-B969-4849-A48A-2FD437CE6A36}" type="datetimeFigureOut">
               <a:rPr lang="en-US" smtClean="0"/>
-              <a:t>7/6/2014</a:t>
+              <a:t>7/10/2014</a:t>
             </a:fld>
             <a:endParaRPr lang="en-US"/>
           </a:p>
@@ -8896,7 +8896,7 @@
           <a:p>
             <a:fld id="{9B6A8A6C-B969-4849-A48A-2FD437CE6A36}" type="datetimeFigureOut">
               <a:rPr lang="en-US" smtClean="0"/>
-              <a:t>7/6/2014</a:t>
+              <a:t>7/10/2014</a:t>
             </a:fld>
             <a:endParaRPr lang="en-US"/>
           </a:p>
@@ -9144,7 +9144,7 @@
           <a:p>
             <a:fld id="{9B6A8A6C-B969-4849-A48A-2FD437CE6A36}" type="datetimeFigureOut">
               <a:rPr lang="en-US" smtClean="0"/>
-              <a:t>7/6/2014</a:t>
+              <a:t>7/10/2014</a:t>
             </a:fld>
             <a:endParaRPr lang="en-US"/>
           </a:p>
@@ -9352,7 +9352,7 @@
           <a:p>
             <a:fld id="{9B6A8A6C-B969-4849-A48A-2FD437CE6A36}" type="datetimeFigureOut">
               <a:rPr lang="en-US" smtClean="0"/>
-              <a:t>7/6/2014</a:t>
+              <a:t>7/10/2014</a:t>
             </a:fld>
             <a:endParaRPr lang="en-US"/>
           </a:p>
@@ -9900,11 +9900,7 @@
             <a:pPr algn="ctr"/>
             <a:r>
               <a:rPr lang="en-GB" dirty="0" err="1" smtClean="0"/>
-              <a:t>Max</a:t>
-            </a:r>
-            <a:r>
-              <a:rPr lang="en-GB" dirty="0" err="1" smtClean="0"/>
-              <a:t>.scala</a:t>
+              <a:t>Max.scala</a:t>
             </a:r>
             <a:r>
               <a:rPr lang="en-GB" dirty="0" smtClean="0"/>
@@ -10429,10 +10425,6 @@
               </a:rPr>
               <a:t>)</a:t>
             </a:r>
-            <a:endParaRPr lang="en-GB" sz="2400" i="1" dirty="0" smtClean="0">
-              <a:latin typeface="Comic Sans MS" panose="030F0702030302020204" pitchFamily="66" charset="0"/>
-              <a:cs typeface="Consolas" panose="020B0609020204030204" pitchFamily="49" charset="0"/>
-            </a:endParaRPr>
           </a:p>
           <a:p>
             <a:pPr marL="742950" lvl="1" indent="-285750">
@@ -11422,14 +11414,7 @@
                 <a:latin typeface="Comic Sans MS" panose="030F0702030302020204" pitchFamily="66" charset="0"/>
                 <a:cs typeface="Consolas" panose="020B0609020204030204" pitchFamily="49" charset="0"/>
               </a:rPr>
-              <a:t>Application Specific </a:t>
-            </a:r>
-            <a:r>
-              <a:rPr lang="en-GB" dirty="0" smtClean="0">
-                <a:latin typeface="Comic Sans MS" panose="030F0702030302020204" pitchFamily="66" charset="0"/>
-                <a:cs typeface="Consolas" panose="020B0609020204030204" pitchFamily="49" charset="0"/>
-              </a:rPr>
-              <a:t>Integrated Circuit – Your own custom microchips</a:t>
+              <a:t>Application Specific Integrated Circuit – Your own custom microchips</a:t>
             </a:r>
           </a:p>
           <a:p>
@@ -11516,6 +11501,66 @@
           </a:p>
         </p:txBody>
       </p:sp>
+      <p:pic>
+        <p:nvPicPr>
+          <p:cNvPr id="2" name="Picture 1"/>
+          <p:cNvPicPr>
+            <a:picLocks noChangeAspect="1"/>
+          </p:cNvPicPr>
+          <p:nvPr/>
+        </p:nvPicPr>
+        <p:blipFill>
+          <a:blip r:embed="rId2">
+            <a:extLst>
+              <a:ext uri="{28A0092B-C50C-407E-A947-70E740481C1C}">
+                <a14:useLocalDpi xmlns:a14="http://schemas.microsoft.com/office/drawing/2010/main" val="0"/>
+              </a:ext>
+            </a:extLst>
+          </a:blip>
+          <a:stretch>
+            <a:fillRect/>
+          </a:stretch>
+        </p:blipFill>
+        <p:spPr>
+          <a:xfrm>
+            <a:off x="4823799" y="3999338"/>
+            <a:ext cx="3040635" cy="2478363"/>
+          </a:xfrm>
+          <a:prstGeom prst="rect">
+            <a:avLst/>
+          </a:prstGeom>
+        </p:spPr>
+      </p:pic>
+      <p:pic>
+        <p:nvPicPr>
+          <p:cNvPr id="3" name="Picture 2"/>
+          <p:cNvPicPr>
+            <a:picLocks noChangeAspect="1"/>
+          </p:cNvPicPr>
+          <p:nvPr/>
+        </p:nvPicPr>
+        <p:blipFill>
+          <a:blip r:embed="rId3">
+            <a:extLst>
+              <a:ext uri="{28A0092B-C50C-407E-A947-70E740481C1C}">
+                <a14:useLocalDpi xmlns:a14="http://schemas.microsoft.com/office/drawing/2010/main" val="0"/>
+              </a:ext>
+            </a:extLst>
+          </a:blip>
+          <a:stretch>
+            <a:fillRect/>
+          </a:stretch>
+        </p:blipFill>
+        <p:spPr>
+          <a:xfrm>
+            <a:off x="838200" y="3809188"/>
+            <a:ext cx="2858662" cy="2858662"/>
+          </a:xfrm>
+          <a:prstGeom prst="rect">
+            <a:avLst/>
+          </a:prstGeom>
+        </p:spPr>
+      </p:pic>
     </p:spTree>
     <p:extLst>
       <p:ext uri="{BB962C8B-B14F-4D97-AF65-F5344CB8AC3E}">
@@ -12099,21 +12144,7 @@
                 <a:latin typeface="Comic Sans MS" panose="030F0702030302020204" pitchFamily="66" charset="0"/>
                 <a:cs typeface="Consolas" panose="020B0609020204030204" pitchFamily="49" charset="0"/>
               </a:rPr>
-              <a:t>The kernels are called </a:t>
-            </a:r>
-            <a:r>
-              <a:rPr lang="en-GB" dirty="0" smtClean="0">
-                <a:latin typeface="Comic Sans MS" panose="030F0702030302020204" pitchFamily="66" charset="0"/>
-                <a:cs typeface="Consolas" panose="020B0609020204030204" pitchFamily="49" charset="0"/>
-              </a:rPr>
-              <a:t>using </a:t>
-            </a:r>
-            <a:r>
-              <a:rPr lang="en-GB" dirty="0" smtClean="0">
-                <a:latin typeface="Comic Sans MS" panose="030F0702030302020204" pitchFamily="66" charset="0"/>
-                <a:cs typeface="Consolas" panose="020B0609020204030204" pitchFamily="49" charset="0"/>
-              </a:rPr>
-              <a:t>a C/C++ API</a:t>
+              <a:t>The kernels are called using a C/C++ API</a:t>
             </a:r>
           </a:p>
           <a:p>
@@ -13479,14 +13510,7 @@
                 <a:latin typeface="Comic Sans MS" panose="030F0702030302020204" pitchFamily="66" charset="0"/>
                 <a:cs typeface="Consolas" panose="020B0609020204030204" pitchFamily="49" charset="0"/>
               </a:rPr>
-              <a:t>Each </a:t>
-            </a:r>
-            <a:r>
-              <a:rPr lang="en-GB" dirty="0" smtClean="0">
-                <a:latin typeface="Comic Sans MS" panose="030F0702030302020204" pitchFamily="66" charset="0"/>
-                <a:cs typeface="Consolas" panose="020B0609020204030204" pitchFamily="49" charset="0"/>
-              </a:rPr>
-              <a:t>processing element(PE) does </a:t>
+              <a:t>Each processing element(PE) does </a:t>
             </a:r>
             <a:r>
               <a:rPr lang="en-GB" b="1" dirty="0" smtClean="0">
@@ -13534,14 +13558,7 @@
                 <a:latin typeface="Comic Sans MS" panose="030F0702030302020204" pitchFamily="66" charset="0"/>
                 <a:cs typeface="Consolas" panose="020B0609020204030204" pitchFamily="49" charset="0"/>
               </a:rPr>
-              <a:t>Not </a:t>
-            </a:r>
-            <a:r>
-              <a:rPr lang="en-GB" dirty="0" smtClean="0">
-                <a:latin typeface="Comic Sans MS" panose="030F0702030302020204" pitchFamily="66" charset="0"/>
-                <a:cs typeface="Consolas" panose="020B0609020204030204" pitchFamily="49" charset="0"/>
-              </a:rPr>
-              <a:t>everything translates well to </a:t>
+              <a:t>Not everything translates well to </a:t>
             </a:r>
             <a:r>
               <a:rPr lang="en-GB" dirty="0" err="1" smtClean="0">
@@ -19482,10 +19499,6 @@
               </a:rPr>
               <a:t>nd much more</a:t>
             </a:r>
-            <a:endParaRPr lang="en-GB" dirty="0" smtClean="0">
-              <a:latin typeface="Comic Sans MS" panose="030F0702030302020204" pitchFamily="66" charset="0"/>
-              <a:cs typeface="Consolas" panose="020B0609020204030204" pitchFamily="49" charset="0"/>
-            </a:endParaRPr>
           </a:p>
           <a:p>
             <a:pPr marL="285750" indent="-285750">
@@ -20559,11 +20572,7 @@
             <a:pPr algn="ctr"/>
             <a:r>
               <a:rPr lang="en-GB" dirty="0" err="1" smtClean="0"/>
-              <a:t>GCD</a:t>
-            </a:r>
-            <a:r>
-              <a:rPr lang="en-GB" dirty="0" err="1" smtClean="0"/>
-              <a:t>.scala</a:t>
+              <a:t>GCD.scala</a:t>
             </a:r>
             <a:endParaRPr lang="en-US" dirty="0"/>
           </a:p>

</xml_diff>